<commit_message>
Updated presentation file and its supps
</commit_message>
<xml_diff>
--- a/Architecture and parameter search/DeepPyschPresentation_7_2_20.pptx
+++ b/Architecture and parameter search/DeepPyschPresentation_7_2_20.pptx
@@ -10,6 +10,7 @@
     <p:sldId id="259" r:id="rId4"/>
     <p:sldId id="261" r:id="rId5"/>
     <p:sldId id="260" r:id="rId6"/>
+    <p:sldId id="256" r:id="rId7"/>
   </p:sldIdLst>
   <p:sldSz cx="12192000" cy="6858000"/>
   <p:notesSz cx="6858000" cy="9144000"/>
@@ -108,6 +109,11 @@
       </a:defRPr>
     </a:lvl9pPr>
   </p:defaultTextStyle>
+  <p:extLst>
+    <p:ext uri="{EFAFB233-063F-42B5-8137-9DF3F51BA10A}">
+      <p15:sldGuideLst xmlns:p15="http://schemas.microsoft.com/office/powerpoint/2012/main"/>
+    </p:ext>
+  </p:extLst>
 </p:presentation>
 </file>
 
@@ -4329,43 +4335,6 @@
       </p:sp>
       <p:sp>
         <p:nvSpPr>
-          <p:cNvPr id="3" name="Subtitle 2">
-            <a:extLst>
-              <a:ext uri="{FF2B5EF4-FFF2-40B4-BE49-F238E27FC236}">
-                <a16:creationId xmlns:a16="http://schemas.microsoft.com/office/drawing/2014/main" id="{37510D53-B0EE-4487-9B27-8DE96D2B0D64}"/>
-              </a:ext>
-            </a:extLst>
-          </p:cNvPr>
-          <p:cNvSpPr>
-            <a:spLocks noGrp="1"/>
-          </p:cNvSpPr>
-          <p:nvPr>
-            <p:ph type="subTitle" idx="1"/>
-          </p:nvPr>
-        </p:nvSpPr>
-        <p:spPr>
-          <a:xfrm>
-            <a:off x="4439633" y="4518923"/>
-            <a:ext cx="3312734" cy="1141851"/>
-          </a:xfrm>
-          <a:noFill/>
-        </p:spPr>
-        <p:txBody>
-          <a:bodyPr>
-            <a:normAutofit/>
-          </a:bodyPr>
-          <a:lstStyle/>
-          <a:p>
-            <a:endParaRPr lang="en-AU" sz="2000">
-              <a:solidFill>
-                <a:srgbClr val="080808"/>
-              </a:solidFill>
-            </a:endParaRPr>
-          </a:p>
-        </p:txBody>
-      </p:sp>
-      <p:sp>
-        <p:nvSpPr>
           <p:cNvPr id="26" name="Isosceles Triangle 25">
             <a:extLst>
               <a:ext uri="{FF2B5EF4-FFF2-40B4-BE49-F238E27FC236}">
@@ -5925,7 +5894,7 @@
           <a:p>
             <a:r>
               <a:rPr lang="en-AU" dirty="0"/>
-              <a:t>Models Teste</a:t>
+              <a:t>Models Tested</a:t>
             </a:r>
           </a:p>
         </p:txBody>
@@ -6570,7 +6539,7 @@
                     <a:lstStyle/>
                     <a:p>
                       <a:r>
-                        <a:rPr lang="en-AU" sz="2700"/>
+                        <a:rPr lang="en-AU" sz="2700" dirty="0"/>
                         <a:t>Single Model performance (TPR, ROC)</a:t>
                       </a:r>
                     </a:p>
@@ -6856,6 +6825,2601 @@
     <p:extLst>
       <p:ext uri="{BB962C8B-B14F-4D97-AF65-F5344CB8AC3E}">
         <p14:creationId xmlns:p14="http://schemas.microsoft.com/office/powerpoint/2010/main" val="1318324784"/>
+      </p:ext>
+    </p:extLst>
+  </p:cSld>
+  <p:clrMapOvr>
+    <a:masterClrMapping/>
+  </p:clrMapOvr>
+</p:sld>
+</file>
+
+<file path=ppt/slides/slide6.xml><?xml version="1.0" encoding="utf-8"?>
+<p:sld xmlns:a="http://schemas.openxmlformats.org/drawingml/2006/main" xmlns:r="http://schemas.openxmlformats.org/officeDocument/2006/relationships" xmlns:p="http://schemas.openxmlformats.org/presentationml/2006/main">
+  <p:cSld>
+    <p:spTree>
+      <p:nvGrpSpPr>
+        <p:cNvPr id="1" name=""/>
+        <p:cNvGrpSpPr/>
+        <p:nvPr/>
+      </p:nvGrpSpPr>
+      <p:grpSpPr>
+        <a:xfrm>
+          <a:off x="0" y="0"/>
+          <a:ext cx="0" cy="0"/>
+          <a:chOff x="0" y="0"/>
+          <a:chExt cx="0" cy="0"/>
+        </a:xfrm>
+      </p:grpSpPr>
+      <p:sp>
+        <p:nvSpPr>
+          <p:cNvPr id="73" name="Rectangle 72">
+            <a:extLst>
+              <a:ext uri="{FF2B5EF4-FFF2-40B4-BE49-F238E27FC236}">
+                <a16:creationId xmlns:a16="http://schemas.microsoft.com/office/drawing/2014/main" id="{74A6B0CE-0B26-4D42-80C6-4DEE50526B76}"/>
+              </a:ext>
+            </a:extLst>
+          </p:cNvPr>
+          <p:cNvSpPr/>
+          <p:nvPr/>
+        </p:nvSpPr>
+        <p:spPr>
+          <a:xfrm>
+            <a:off x="10748103" y="4268616"/>
+            <a:ext cx="1109030" cy="453866"/>
+          </a:xfrm>
+          <a:prstGeom prst="rect">
+            <a:avLst/>
+          </a:prstGeom>
+          <a:solidFill>
+            <a:schemeClr val="accent6"/>
+          </a:solidFill>
+          <a:ln>
+            <a:solidFill>
+              <a:schemeClr val="accent6"/>
+            </a:solidFill>
+          </a:ln>
+        </p:spPr>
+        <p:style>
+          <a:lnRef idx="2">
+            <a:schemeClr val="accent1">
+              <a:shade val="50000"/>
+            </a:schemeClr>
+          </a:lnRef>
+          <a:fillRef idx="1">
+            <a:schemeClr val="accent1"/>
+          </a:fillRef>
+          <a:effectRef idx="0">
+            <a:schemeClr val="accent1"/>
+          </a:effectRef>
+          <a:fontRef idx="minor">
+            <a:schemeClr val="lt1"/>
+          </a:fontRef>
+        </p:style>
+        <p:txBody>
+          <a:bodyPr rtlCol="0" anchor="ctr"/>
+          <a:lstStyle/>
+          <a:p>
+            <a:pPr algn="ctr"/>
+            <a:endParaRPr lang="en-AU"/>
+          </a:p>
+        </p:txBody>
+      </p:sp>
+      <p:sp>
+        <p:nvSpPr>
+          <p:cNvPr id="72" name="Rectangle 71">
+            <a:extLst>
+              <a:ext uri="{FF2B5EF4-FFF2-40B4-BE49-F238E27FC236}">
+                <a16:creationId xmlns:a16="http://schemas.microsoft.com/office/drawing/2014/main" id="{516CC935-E5AF-4DD4-9519-A752E1E04E43}"/>
+              </a:ext>
+            </a:extLst>
+          </p:cNvPr>
+          <p:cNvSpPr/>
+          <p:nvPr/>
+        </p:nvSpPr>
+        <p:spPr>
+          <a:xfrm>
+            <a:off x="10792445" y="3372679"/>
+            <a:ext cx="1064688" cy="487722"/>
+          </a:xfrm>
+          <a:prstGeom prst="rect">
+            <a:avLst/>
+          </a:prstGeom>
+          <a:solidFill>
+            <a:schemeClr val="accent6"/>
+          </a:solidFill>
+          <a:ln>
+            <a:solidFill>
+              <a:schemeClr val="accent6"/>
+            </a:solidFill>
+          </a:ln>
+        </p:spPr>
+        <p:style>
+          <a:lnRef idx="2">
+            <a:schemeClr val="accent1">
+              <a:shade val="50000"/>
+            </a:schemeClr>
+          </a:lnRef>
+          <a:fillRef idx="1">
+            <a:schemeClr val="accent1"/>
+          </a:fillRef>
+          <a:effectRef idx="0">
+            <a:schemeClr val="accent1"/>
+          </a:effectRef>
+          <a:fontRef idx="minor">
+            <a:schemeClr val="lt1"/>
+          </a:fontRef>
+        </p:style>
+        <p:txBody>
+          <a:bodyPr rtlCol="0" anchor="ctr"/>
+          <a:lstStyle/>
+          <a:p>
+            <a:pPr algn="ctr"/>
+            <a:endParaRPr lang="en-AU"/>
+          </a:p>
+        </p:txBody>
+      </p:sp>
+      <p:sp>
+        <p:nvSpPr>
+          <p:cNvPr id="71" name="Rectangle 70">
+            <a:extLst>
+              <a:ext uri="{FF2B5EF4-FFF2-40B4-BE49-F238E27FC236}">
+                <a16:creationId xmlns:a16="http://schemas.microsoft.com/office/drawing/2014/main" id="{E1D6FFBC-F9B6-4BD9-9A03-09909F9BF84A}"/>
+              </a:ext>
+            </a:extLst>
+          </p:cNvPr>
+          <p:cNvSpPr/>
+          <p:nvPr/>
+        </p:nvSpPr>
+        <p:spPr>
+          <a:xfrm>
+            <a:off x="10792832" y="2499919"/>
+            <a:ext cx="1064688" cy="487722"/>
+          </a:xfrm>
+          <a:prstGeom prst="rect">
+            <a:avLst/>
+          </a:prstGeom>
+          <a:solidFill>
+            <a:schemeClr val="accent6"/>
+          </a:solidFill>
+          <a:ln>
+            <a:solidFill>
+              <a:schemeClr val="accent6"/>
+            </a:solidFill>
+          </a:ln>
+        </p:spPr>
+        <p:style>
+          <a:lnRef idx="2">
+            <a:schemeClr val="accent1">
+              <a:shade val="50000"/>
+            </a:schemeClr>
+          </a:lnRef>
+          <a:fillRef idx="1">
+            <a:schemeClr val="accent1"/>
+          </a:fillRef>
+          <a:effectRef idx="0">
+            <a:schemeClr val="accent1"/>
+          </a:effectRef>
+          <a:fontRef idx="minor">
+            <a:schemeClr val="lt1"/>
+          </a:fontRef>
+        </p:style>
+        <p:txBody>
+          <a:bodyPr rtlCol="0" anchor="ctr"/>
+          <a:lstStyle/>
+          <a:p>
+            <a:pPr algn="ctr"/>
+            <a:endParaRPr lang="en-AU"/>
+          </a:p>
+        </p:txBody>
+      </p:sp>
+      <p:sp>
+        <p:nvSpPr>
+          <p:cNvPr id="55" name="Rectangle 54">
+            <a:extLst>
+              <a:ext uri="{FF2B5EF4-FFF2-40B4-BE49-F238E27FC236}">
+                <a16:creationId xmlns:a16="http://schemas.microsoft.com/office/drawing/2014/main" id="{284D9CD1-A100-4406-A402-E74A6B4E67C6}"/>
+              </a:ext>
+            </a:extLst>
+          </p:cNvPr>
+          <p:cNvSpPr/>
+          <p:nvPr/>
+        </p:nvSpPr>
+        <p:spPr>
+          <a:xfrm>
+            <a:off x="9097829" y="4239429"/>
+            <a:ext cx="549568" cy="487722"/>
+          </a:xfrm>
+          <a:prstGeom prst="rect">
+            <a:avLst/>
+          </a:prstGeom>
+          <a:solidFill>
+            <a:schemeClr val="accent6"/>
+          </a:solidFill>
+          <a:ln>
+            <a:solidFill>
+              <a:schemeClr val="tx2"/>
+            </a:solidFill>
+          </a:ln>
+        </p:spPr>
+        <p:style>
+          <a:lnRef idx="2">
+            <a:schemeClr val="accent1">
+              <a:shade val="50000"/>
+            </a:schemeClr>
+          </a:lnRef>
+          <a:fillRef idx="1">
+            <a:schemeClr val="accent1"/>
+          </a:fillRef>
+          <a:effectRef idx="0">
+            <a:schemeClr val="accent1"/>
+          </a:effectRef>
+          <a:fontRef idx="minor">
+            <a:schemeClr val="lt1"/>
+          </a:fontRef>
+        </p:style>
+        <p:txBody>
+          <a:bodyPr rtlCol="0" anchor="ctr"/>
+          <a:lstStyle/>
+          <a:p>
+            <a:pPr algn="ctr"/>
+            <a:endParaRPr lang="en-AU"/>
+          </a:p>
+        </p:txBody>
+      </p:sp>
+      <p:sp>
+        <p:nvSpPr>
+          <p:cNvPr id="70" name="Rectangle 69">
+            <a:extLst>
+              <a:ext uri="{FF2B5EF4-FFF2-40B4-BE49-F238E27FC236}">
+                <a16:creationId xmlns:a16="http://schemas.microsoft.com/office/drawing/2014/main" id="{4BE55FC2-4A81-4BDB-BB6E-5FE930DFC0D7}"/>
+              </a:ext>
+            </a:extLst>
+          </p:cNvPr>
+          <p:cNvSpPr/>
+          <p:nvPr/>
+        </p:nvSpPr>
+        <p:spPr>
+          <a:xfrm>
+            <a:off x="10822219" y="1582472"/>
+            <a:ext cx="1016474" cy="463475"/>
+          </a:xfrm>
+          <a:prstGeom prst="rect">
+            <a:avLst/>
+          </a:prstGeom>
+          <a:solidFill>
+            <a:schemeClr val="accent6"/>
+          </a:solidFill>
+          <a:ln>
+            <a:solidFill>
+              <a:schemeClr val="accent6"/>
+            </a:solidFill>
+          </a:ln>
+        </p:spPr>
+        <p:style>
+          <a:lnRef idx="2">
+            <a:schemeClr val="accent1">
+              <a:shade val="50000"/>
+            </a:schemeClr>
+          </a:lnRef>
+          <a:fillRef idx="1">
+            <a:schemeClr val="accent1"/>
+          </a:fillRef>
+          <a:effectRef idx="0">
+            <a:schemeClr val="accent1"/>
+          </a:effectRef>
+          <a:fontRef idx="minor">
+            <a:schemeClr val="lt1"/>
+          </a:fontRef>
+        </p:style>
+        <p:txBody>
+          <a:bodyPr rtlCol="0" anchor="ctr"/>
+          <a:lstStyle/>
+          <a:p>
+            <a:pPr algn="ctr"/>
+            <a:endParaRPr lang="en-AU"/>
+          </a:p>
+        </p:txBody>
+      </p:sp>
+      <p:sp>
+        <p:nvSpPr>
+          <p:cNvPr id="54" name="Rectangle 53">
+            <a:extLst>
+              <a:ext uri="{FF2B5EF4-FFF2-40B4-BE49-F238E27FC236}">
+                <a16:creationId xmlns:a16="http://schemas.microsoft.com/office/drawing/2014/main" id="{DBE9E0C2-E53C-4FF4-BABF-E65C5704B4A0}"/>
+              </a:ext>
+            </a:extLst>
+          </p:cNvPr>
+          <p:cNvSpPr/>
+          <p:nvPr/>
+        </p:nvSpPr>
+        <p:spPr>
+          <a:xfrm>
+            <a:off x="1489696" y="4256878"/>
+            <a:ext cx="8753547" cy="475984"/>
+          </a:xfrm>
+          <a:prstGeom prst="rect">
+            <a:avLst/>
+          </a:prstGeom>
+          <a:solidFill>
+            <a:schemeClr val="accent6"/>
+          </a:solidFill>
+          <a:ln>
+            <a:solidFill>
+              <a:schemeClr val="accent6"/>
+            </a:solidFill>
+          </a:ln>
+        </p:spPr>
+        <p:style>
+          <a:lnRef idx="2">
+            <a:schemeClr val="accent1">
+              <a:shade val="50000"/>
+            </a:schemeClr>
+          </a:lnRef>
+          <a:fillRef idx="1">
+            <a:schemeClr val="accent1"/>
+          </a:fillRef>
+          <a:effectRef idx="0">
+            <a:schemeClr val="accent1"/>
+          </a:effectRef>
+          <a:fontRef idx="minor">
+            <a:schemeClr val="lt1"/>
+          </a:fontRef>
+        </p:style>
+        <p:txBody>
+          <a:bodyPr rtlCol="0" anchor="ctr"/>
+          <a:lstStyle/>
+          <a:p>
+            <a:pPr algn="ctr"/>
+            <a:endParaRPr lang="en-AU"/>
+          </a:p>
+        </p:txBody>
+      </p:sp>
+      <p:sp>
+        <p:nvSpPr>
+          <p:cNvPr id="53" name="Rectangle 52">
+            <a:extLst>
+              <a:ext uri="{FF2B5EF4-FFF2-40B4-BE49-F238E27FC236}">
+                <a16:creationId xmlns:a16="http://schemas.microsoft.com/office/drawing/2014/main" id="{1B7B0666-A430-4FE0-B991-87F7582F38B2}"/>
+              </a:ext>
+            </a:extLst>
+          </p:cNvPr>
+          <p:cNvSpPr/>
+          <p:nvPr/>
+        </p:nvSpPr>
+        <p:spPr>
+          <a:xfrm>
+            <a:off x="10253060" y="4256878"/>
+            <a:ext cx="549568" cy="487722"/>
+          </a:xfrm>
+          <a:prstGeom prst="rect">
+            <a:avLst/>
+          </a:prstGeom>
+          <a:solidFill>
+            <a:schemeClr val="accent6"/>
+          </a:solidFill>
+          <a:ln>
+            <a:solidFill>
+              <a:schemeClr val="accent6"/>
+            </a:solidFill>
+          </a:ln>
+        </p:spPr>
+        <p:style>
+          <a:lnRef idx="2">
+            <a:schemeClr val="accent1">
+              <a:shade val="50000"/>
+            </a:schemeClr>
+          </a:lnRef>
+          <a:fillRef idx="1">
+            <a:schemeClr val="accent1"/>
+          </a:fillRef>
+          <a:effectRef idx="0">
+            <a:schemeClr val="accent1"/>
+          </a:effectRef>
+          <a:fontRef idx="minor">
+            <a:schemeClr val="lt1"/>
+          </a:fontRef>
+        </p:style>
+        <p:txBody>
+          <a:bodyPr rtlCol="0" anchor="ctr"/>
+          <a:lstStyle/>
+          <a:p>
+            <a:pPr algn="ctr"/>
+            <a:endParaRPr lang="en-AU"/>
+          </a:p>
+        </p:txBody>
+      </p:sp>
+      <p:sp>
+        <p:nvSpPr>
+          <p:cNvPr id="63" name="Rectangle 62">
+            <a:extLst>
+              <a:ext uri="{FF2B5EF4-FFF2-40B4-BE49-F238E27FC236}">
+                <a16:creationId xmlns:a16="http://schemas.microsoft.com/office/drawing/2014/main" id="{23631629-B7B5-4348-93FB-F9A39F9C6291}"/>
+              </a:ext>
+            </a:extLst>
+          </p:cNvPr>
+          <p:cNvSpPr/>
+          <p:nvPr/>
+        </p:nvSpPr>
+        <p:spPr>
+          <a:xfrm>
+            <a:off x="8257118" y="4268616"/>
+            <a:ext cx="814558" cy="464246"/>
+          </a:xfrm>
+          <a:prstGeom prst="rect">
+            <a:avLst/>
+          </a:prstGeom>
+          <a:solidFill>
+            <a:schemeClr val="accent6"/>
+          </a:solidFill>
+          <a:ln>
+            <a:solidFill>
+              <a:schemeClr val="accent6"/>
+            </a:solidFill>
+          </a:ln>
+        </p:spPr>
+        <p:style>
+          <a:lnRef idx="2">
+            <a:schemeClr val="accent1">
+              <a:shade val="50000"/>
+            </a:schemeClr>
+          </a:lnRef>
+          <a:fillRef idx="1">
+            <a:schemeClr val="accent1"/>
+          </a:fillRef>
+          <a:effectRef idx="0">
+            <a:schemeClr val="accent1"/>
+          </a:effectRef>
+          <a:fontRef idx="minor">
+            <a:schemeClr val="lt1"/>
+          </a:fontRef>
+        </p:style>
+        <p:txBody>
+          <a:bodyPr rtlCol="0" anchor="ctr"/>
+          <a:lstStyle/>
+          <a:p>
+            <a:pPr algn="ctr"/>
+            <a:endParaRPr lang="en-AU"/>
+          </a:p>
+        </p:txBody>
+      </p:sp>
+      <p:sp>
+        <p:nvSpPr>
+          <p:cNvPr id="62" name="Rectangle 61">
+            <a:extLst>
+              <a:ext uri="{FF2B5EF4-FFF2-40B4-BE49-F238E27FC236}">
+                <a16:creationId xmlns:a16="http://schemas.microsoft.com/office/drawing/2014/main" id="{1C0C7A42-C2D0-4344-A772-883DFAA86553}"/>
+              </a:ext>
+            </a:extLst>
+          </p:cNvPr>
+          <p:cNvSpPr/>
+          <p:nvPr/>
+        </p:nvSpPr>
+        <p:spPr>
+          <a:xfrm>
+            <a:off x="10244772" y="3399125"/>
+            <a:ext cx="549568" cy="464246"/>
+          </a:xfrm>
+          <a:prstGeom prst="rect">
+            <a:avLst/>
+          </a:prstGeom>
+          <a:solidFill>
+            <a:schemeClr val="accent6"/>
+          </a:solidFill>
+          <a:ln>
+            <a:solidFill>
+              <a:schemeClr val="accent6"/>
+            </a:solidFill>
+          </a:ln>
+        </p:spPr>
+        <p:style>
+          <a:lnRef idx="2">
+            <a:schemeClr val="accent1">
+              <a:shade val="50000"/>
+            </a:schemeClr>
+          </a:lnRef>
+          <a:fillRef idx="1">
+            <a:schemeClr val="accent1"/>
+          </a:fillRef>
+          <a:effectRef idx="0">
+            <a:schemeClr val="accent1"/>
+          </a:effectRef>
+          <a:fontRef idx="minor">
+            <a:schemeClr val="lt1"/>
+          </a:fontRef>
+        </p:style>
+        <p:txBody>
+          <a:bodyPr rtlCol="0" anchor="ctr"/>
+          <a:lstStyle/>
+          <a:p>
+            <a:pPr algn="ctr"/>
+            <a:endParaRPr lang="en-AU"/>
+          </a:p>
+        </p:txBody>
+      </p:sp>
+      <p:sp>
+        <p:nvSpPr>
+          <p:cNvPr id="61" name="Rectangle 60">
+            <a:extLst>
+              <a:ext uri="{FF2B5EF4-FFF2-40B4-BE49-F238E27FC236}">
+                <a16:creationId xmlns:a16="http://schemas.microsoft.com/office/drawing/2014/main" id="{79861446-413A-4201-BAFC-C349366FC417}"/>
+              </a:ext>
+            </a:extLst>
+          </p:cNvPr>
+          <p:cNvSpPr/>
+          <p:nvPr/>
+        </p:nvSpPr>
+        <p:spPr>
+          <a:xfrm>
+            <a:off x="10243264" y="2499919"/>
+            <a:ext cx="549568" cy="487722"/>
+          </a:xfrm>
+          <a:prstGeom prst="rect">
+            <a:avLst/>
+          </a:prstGeom>
+          <a:solidFill>
+            <a:schemeClr val="accent6"/>
+          </a:solidFill>
+          <a:ln>
+            <a:solidFill>
+              <a:schemeClr val="accent6"/>
+            </a:solidFill>
+          </a:ln>
+        </p:spPr>
+        <p:style>
+          <a:lnRef idx="2">
+            <a:schemeClr val="accent1">
+              <a:shade val="50000"/>
+            </a:schemeClr>
+          </a:lnRef>
+          <a:fillRef idx="1">
+            <a:schemeClr val="accent1"/>
+          </a:fillRef>
+          <a:effectRef idx="0">
+            <a:schemeClr val="accent1"/>
+          </a:effectRef>
+          <a:fontRef idx="minor">
+            <a:schemeClr val="lt1"/>
+          </a:fontRef>
+        </p:style>
+        <p:txBody>
+          <a:bodyPr rtlCol="0" anchor="ctr"/>
+          <a:lstStyle/>
+          <a:p>
+            <a:pPr algn="ctr"/>
+            <a:endParaRPr lang="en-AU"/>
+          </a:p>
+        </p:txBody>
+      </p:sp>
+      <p:sp>
+        <p:nvSpPr>
+          <p:cNvPr id="60" name="Rectangle 59">
+            <a:extLst>
+              <a:ext uri="{FF2B5EF4-FFF2-40B4-BE49-F238E27FC236}">
+                <a16:creationId xmlns:a16="http://schemas.microsoft.com/office/drawing/2014/main" id="{90475BCD-9CA8-4241-8916-C6709304624C}"/>
+              </a:ext>
+            </a:extLst>
+          </p:cNvPr>
+          <p:cNvSpPr/>
+          <p:nvPr/>
+        </p:nvSpPr>
+        <p:spPr>
+          <a:xfrm>
+            <a:off x="10243264" y="1588683"/>
+            <a:ext cx="581723" cy="468765"/>
+          </a:xfrm>
+          <a:prstGeom prst="rect">
+            <a:avLst/>
+          </a:prstGeom>
+          <a:solidFill>
+            <a:schemeClr val="accent6"/>
+          </a:solidFill>
+          <a:ln>
+            <a:solidFill>
+              <a:schemeClr val="accent6"/>
+            </a:solidFill>
+          </a:ln>
+        </p:spPr>
+        <p:style>
+          <a:lnRef idx="2">
+            <a:schemeClr val="accent1">
+              <a:shade val="50000"/>
+            </a:schemeClr>
+          </a:lnRef>
+          <a:fillRef idx="1">
+            <a:schemeClr val="accent1"/>
+          </a:fillRef>
+          <a:effectRef idx="0">
+            <a:schemeClr val="accent1"/>
+          </a:effectRef>
+          <a:fontRef idx="minor">
+            <a:schemeClr val="lt1"/>
+          </a:fontRef>
+        </p:style>
+        <p:txBody>
+          <a:bodyPr rtlCol="0" anchor="ctr"/>
+          <a:lstStyle/>
+          <a:p>
+            <a:pPr algn="ctr"/>
+            <a:endParaRPr lang="en-AU"/>
+          </a:p>
+        </p:txBody>
+      </p:sp>
+      <p:sp>
+        <p:nvSpPr>
+          <p:cNvPr id="59" name="Rectangle 58">
+            <a:extLst>
+              <a:ext uri="{FF2B5EF4-FFF2-40B4-BE49-F238E27FC236}">
+                <a16:creationId xmlns:a16="http://schemas.microsoft.com/office/drawing/2014/main" id="{EF37BA98-2FB2-429B-AD8B-C15AACD6D2B5}"/>
+              </a:ext>
+            </a:extLst>
+          </p:cNvPr>
+          <p:cNvSpPr/>
+          <p:nvPr/>
+        </p:nvSpPr>
+        <p:spPr>
+          <a:xfrm>
+            <a:off x="1498859" y="4268616"/>
+            <a:ext cx="6740924" cy="474719"/>
+          </a:xfrm>
+          <a:prstGeom prst="rect">
+            <a:avLst/>
+          </a:prstGeom>
+          <a:solidFill>
+            <a:schemeClr val="accent6"/>
+          </a:solidFill>
+          <a:ln>
+            <a:solidFill>
+              <a:schemeClr val="accent6"/>
+            </a:solidFill>
+          </a:ln>
+        </p:spPr>
+        <p:style>
+          <a:lnRef idx="2">
+            <a:schemeClr val="accent1">
+              <a:shade val="50000"/>
+            </a:schemeClr>
+          </a:lnRef>
+          <a:fillRef idx="1">
+            <a:schemeClr val="accent1"/>
+          </a:fillRef>
+          <a:effectRef idx="0">
+            <a:schemeClr val="accent1"/>
+          </a:effectRef>
+          <a:fontRef idx="minor">
+            <a:schemeClr val="lt1"/>
+          </a:fontRef>
+        </p:style>
+        <p:txBody>
+          <a:bodyPr rtlCol="0" anchor="ctr"/>
+          <a:lstStyle/>
+          <a:p>
+            <a:pPr algn="ctr"/>
+            <a:endParaRPr lang="en-AU"/>
+          </a:p>
+        </p:txBody>
+      </p:sp>
+      <p:sp>
+        <p:nvSpPr>
+          <p:cNvPr id="58" name="Rectangle 57">
+            <a:extLst>
+              <a:ext uri="{FF2B5EF4-FFF2-40B4-BE49-F238E27FC236}">
+                <a16:creationId xmlns:a16="http://schemas.microsoft.com/office/drawing/2014/main" id="{1F94DCE8-75E9-4B43-A7EF-148574678A19}"/>
+              </a:ext>
+            </a:extLst>
+          </p:cNvPr>
+          <p:cNvSpPr/>
+          <p:nvPr/>
+        </p:nvSpPr>
+        <p:spPr>
+          <a:xfrm>
+            <a:off x="1498858" y="3376176"/>
+            <a:ext cx="8699111" cy="474719"/>
+          </a:xfrm>
+          <a:prstGeom prst="rect">
+            <a:avLst/>
+          </a:prstGeom>
+          <a:solidFill>
+            <a:schemeClr val="accent6"/>
+          </a:solidFill>
+          <a:ln>
+            <a:solidFill>
+              <a:schemeClr val="accent6"/>
+            </a:solidFill>
+          </a:ln>
+        </p:spPr>
+        <p:style>
+          <a:lnRef idx="2">
+            <a:schemeClr val="accent1">
+              <a:shade val="50000"/>
+            </a:schemeClr>
+          </a:lnRef>
+          <a:fillRef idx="1">
+            <a:schemeClr val="accent1"/>
+          </a:fillRef>
+          <a:effectRef idx="0">
+            <a:schemeClr val="accent1"/>
+          </a:effectRef>
+          <a:fontRef idx="minor">
+            <a:schemeClr val="lt1"/>
+          </a:fontRef>
+        </p:style>
+        <p:txBody>
+          <a:bodyPr rtlCol="0" anchor="ctr"/>
+          <a:lstStyle/>
+          <a:p>
+            <a:pPr algn="ctr"/>
+            <a:endParaRPr lang="en-AU"/>
+          </a:p>
+        </p:txBody>
+      </p:sp>
+      <p:sp>
+        <p:nvSpPr>
+          <p:cNvPr id="57" name="Rectangle 56">
+            <a:extLst>
+              <a:ext uri="{FF2B5EF4-FFF2-40B4-BE49-F238E27FC236}">
+                <a16:creationId xmlns:a16="http://schemas.microsoft.com/office/drawing/2014/main" id="{02F21EA3-FAB3-4FFC-AAC0-ADA38257C7D2}"/>
+              </a:ext>
+            </a:extLst>
+          </p:cNvPr>
+          <p:cNvSpPr/>
+          <p:nvPr/>
+        </p:nvSpPr>
+        <p:spPr>
+          <a:xfrm>
+            <a:off x="1498858" y="2512922"/>
+            <a:ext cx="8699111" cy="474719"/>
+          </a:xfrm>
+          <a:prstGeom prst="rect">
+            <a:avLst/>
+          </a:prstGeom>
+          <a:solidFill>
+            <a:schemeClr val="accent6"/>
+          </a:solidFill>
+          <a:ln>
+            <a:solidFill>
+              <a:schemeClr val="accent6"/>
+            </a:solidFill>
+          </a:ln>
+        </p:spPr>
+        <p:style>
+          <a:lnRef idx="2">
+            <a:schemeClr val="accent1">
+              <a:shade val="50000"/>
+            </a:schemeClr>
+          </a:lnRef>
+          <a:fillRef idx="1">
+            <a:schemeClr val="accent1"/>
+          </a:fillRef>
+          <a:effectRef idx="0">
+            <a:schemeClr val="accent1"/>
+          </a:effectRef>
+          <a:fontRef idx="minor">
+            <a:schemeClr val="lt1"/>
+          </a:fontRef>
+        </p:style>
+        <p:txBody>
+          <a:bodyPr rtlCol="0" anchor="ctr"/>
+          <a:lstStyle/>
+          <a:p>
+            <a:pPr algn="ctr"/>
+            <a:endParaRPr lang="en-AU"/>
+          </a:p>
+        </p:txBody>
+      </p:sp>
+      <p:sp>
+        <p:nvSpPr>
+          <p:cNvPr id="5" name="Rectangle 4">
+            <a:extLst>
+              <a:ext uri="{FF2B5EF4-FFF2-40B4-BE49-F238E27FC236}">
+                <a16:creationId xmlns:a16="http://schemas.microsoft.com/office/drawing/2014/main" id="{A63520A5-B3AF-4405-8C69-EE4E559F7874}"/>
+              </a:ext>
+            </a:extLst>
+          </p:cNvPr>
+          <p:cNvSpPr/>
+          <p:nvPr/>
+        </p:nvSpPr>
+        <p:spPr>
+          <a:xfrm>
+            <a:off x="1483133" y="2502450"/>
+            <a:ext cx="10368105" cy="485192"/>
+          </a:xfrm>
+          <a:prstGeom prst="rect">
+            <a:avLst/>
+          </a:prstGeom>
+          <a:noFill/>
+        </p:spPr>
+        <p:style>
+          <a:lnRef idx="2">
+            <a:schemeClr val="accent1">
+              <a:shade val="50000"/>
+            </a:schemeClr>
+          </a:lnRef>
+          <a:fillRef idx="1">
+            <a:schemeClr val="accent1"/>
+          </a:fillRef>
+          <a:effectRef idx="0">
+            <a:schemeClr val="accent1"/>
+          </a:effectRef>
+          <a:fontRef idx="minor">
+            <a:schemeClr val="lt1"/>
+          </a:fontRef>
+        </p:style>
+        <p:txBody>
+          <a:bodyPr rtlCol="0" anchor="ctr"/>
+          <a:lstStyle/>
+          <a:p>
+            <a:pPr algn="ctr"/>
+            <a:endParaRPr lang="en-AU"/>
+          </a:p>
+        </p:txBody>
+      </p:sp>
+      <p:sp>
+        <p:nvSpPr>
+          <p:cNvPr id="6" name="Rectangle 5">
+            <a:extLst>
+              <a:ext uri="{FF2B5EF4-FFF2-40B4-BE49-F238E27FC236}">
+                <a16:creationId xmlns:a16="http://schemas.microsoft.com/office/drawing/2014/main" id="{36F4B013-7232-4EC9-B821-E3B86765AAFC}"/>
+              </a:ext>
+            </a:extLst>
+          </p:cNvPr>
+          <p:cNvSpPr/>
+          <p:nvPr/>
+        </p:nvSpPr>
+        <p:spPr>
+          <a:xfrm>
+            <a:off x="1483134" y="3378179"/>
+            <a:ext cx="10368104" cy="485192"/>
+          </a:xfrm>
+          <a:prstGeom prst="rect">
+            <a:avLst/>
+          </a:prstGeom>
+          <a:noFill/>
+        </p:spPr>
+        <p:style>
+          <a:lnRef idx="2">
+            <a:schemeClr val="accent1">
+              <a:shade val="50000"/>
+            </a:schemeClr>
+          </a:lnRef>
+          <a:fillRef idx="1">
+            <a:schemeClr val="accent1"/>
+          </a:fillRef>
+          <a:effectRef idx="0">
+            <a:schemeClr val="accent1"/>
+          </a:effectRef>
+          <a:fontRef idx="minor">
+            <a:schemeClr val="lt1"/>
+          </a:fontRef>
+        </p:style>
+        <p:txBody>
+          <a:bodyPr rtlCol="0" anchor="ctr"/>
+          <a:lstStyle/>
+          <a:p>
+            <a:pPr algn="ctr"/>
+            <a:endParaRPr lang="en-AU"/>
+          </a:p>
+        </p:txBody>
+      </p:sp>
+      <p:sp>
+        <p:nvSpPr>
+          <p:cNvPr id="7" name="Rectangle 6">
+            <a:extLst>
+              <a:ext uri="{FF2B5EF4-FFF2-40B4-BE49-F238E27FC236}">
+                <a16:creationId xmlns:a16="http://schemas.microsoft.com/office/drawing/2014/main" id="{47C3CC5D-CB3B-467D-AA7F-4FAA51F42853}"/>
+              </a:ext>
+            </a:extLst>
+          </p:cNvPr>
+          <p:cNvSpPr/>
+          <p:nvPr/>
+        </p:nvSpPr>
+        <p:spPr>
+          <a:xfrm>
+            <a:off x="1483134" y="4253908"/>
+            <a:ext cx="10368104" cy="485192"/>
+          </a:xfrm>
+          <a:prstGeom prst="rect">
+            <a:avLst/>
+          </a:prstGeom>
+          <a:noFill/>
+        </p:spPr>
+        <p:style>
+          <a:lnRef idx="2">
+            <a:schemeClr val="accent1">
+              <a:shade val="50000"/>
+            </a:schemeClr>
+          </a:lnRef>
+          <a:fillRef idx="1">
+            <a:schemeClr val="accent1"/>
+          </a:fillRef>
+          <a:effectRef idx="0">
+            <a:schemeClr val="accent1"/>
+          </a:effectRef>
+          <a:fontRef idx="minor">
+            <a:schemeClr val="lt1"/>
+          </a:fontRef>
+        </p:style>
+        <p:txBody>
+          <a:bodyPr rtlCol="0" anchor="ctr"/>
+          <a:lstStyle/>
+          <a:p>
+            <a:pPr algn="ctr"/>
+            <a:endParaRPr lang="en-AU"/>
+          </a:p>
+        </p:txBody>
+      </p:sp>
+      <p:sp>
+        <p:nvSpPr>
+          <p:cNvPr id="8" name="TextBox 7">
+            <a:extLst>
+              <a:ext uri="{FF2B5EF4-FFF2-40B4-BE49-F238E27FC236}">
+                <a16:creationId xmlns:a16="http://schemas.microsoft.com/office/drawing/2014/main" id="{D9FC5522-4615-4655-A1A7-BA2DF3F07FDC}"/>
+              </a:ext>
+            </a:extLst>
+          </p:cNvPr>
+          <p:cNvSpPr txBox="1"/>
+          <p:nvPr/>
+        </p:nvSpPr>
+        <p:spPr>
+          <a:xfrm>
+            <a:off x="131824" y="2560380"/>
+            <a:ext cx="1199625" cy="369332"/>
+          </a:xfrm>
+          <a:prstGeom prst="rect">
+            <a:avLst/>
+          </a:prstGeom>
+          <a:noFill/>
+        </p:spPr>
+        <p:txBody>
+          <a:bodyPr wrap="square" rtlCol="0">
+            <a:spAutoFit/>
+          </a:bodyPr>
+          <a:lstStyle/>
+          <a:p>
+            <a:r>
+              <a:rPr lang="en-AU" dirty="0" err="1"/>
+              <a:t>HumanFC</a:t>
+            </a:r>
+            <a:endParaRPr lang="en-AU" dirty="0"/>
+          </a:p>
+        </p:txBody>
+      </p:sp>
+      <p:sp>
+        <p:nvSpPr>
+          <p:cNvPr id="9" name="TextBox 8">
+            <a:extLst>
+              <a:ext uri="{FF2B5EF4-FFF2-40B4-BE49-F238E27FC236}">
+                <a16:creationId xmlns:a16="http://schemas.microsoft.com/office/drawing/2014/main" id="{AB7519C3-8978-497A-BAA5-88FA4026DA1F}"/>
+              </a:ext>
+            </a:extLst>
+          </p:cNvPr>
+          <p:cNvSpPr txBox="1"/>
+          <p:nvPr/>
+        </p:nvSpPr>
+        <p:spPr>
+          <a:xfrm>
+            <a:off x="564367" y="1630186"/>
+            <a:ext cx="683361" cy="369332"/>
+          </a:xfrm>
+          <a:prstGeom prst="rect">
+            <a:avLst/>
+          </a:prstGeom>
+          <a:noFill/>
+        </p:spPr>
+        <p:txBody>
+          <a:bodyPr wrap="square" rtlCol="0">
+            <a:spAutoFit/>
+          </a:bodyPr>
+          <a:lstStyle/>
+          <a:p>
+            <a:r>
+              <a:rPr lang="en-AU" dirty="0"/>
+              <a:t>Cage</a:t>
+            </a:r>
+          </a:p>
+        </p:txBody>
+      </p:sp>
+      <p:sp>
+        <p:nvSpPr>
+          <p:cNvPr id="10" name="TextBox 9">
+            <a:extLst>
+              <a:ext uri="{FF2B5EF4-FFF2-40B4-BE49-F238E27FC236}">
+                <a16:creationId xmlns:a16="http://schemas.microsoft.com/office/drawing/2014/main" id="{BD000E00-2FDE-45DC-B8D5-C021779822A6}"/>
+              </a:ext>
+            </a:extLst>
+          </p:cNvPr>
+          <p:cNvSpPr txBox="1"/>
+          <p:nvPr/>
+        </p:nvSpPr>
+        <p:spPr>
+          <a:xfrm>
+            <a:off x="315153" y="3436109"/>
+            <a:ext cx="932575" cy="369332"/>
+          </a:xfrm>
+          <a:prstGeom prst="rect">
+            <a:avLst/>
+          </a:prstGeom>
+          <a:noFill/>
+        </p:spPr>
+        <p:txBody>
+          <a:bodyPr wrap="square" rtlCol="0">
+            <a:spAutoFit/>
+          </a:bodyPr>
+          <a:lstStyle/>
+          <a:p>
+            <a:r>
+              <a:rPr lang="en-AU" dirty="0" err="1"/>
+              <a:t>Epimap</a:t>
+            </a:r>
+            <a:endParaRPr lang="en-AU" dirty="0"/>
+          </a:p>
+        </p:txBody>
+      </p:sp>
+      <p:sp>
+        <p:nvSpPr>
+          <p:cNvPr id="11" name="TextBox 10">
+            <a:extLst>
+              <a:ext uri="{FF2B5EF4-FFF2-40B4-BE49-F238E27FC236}">
+                <a16:creationId xmlns:a16="http://schemas.microsoft.com/office/drawing/2014/main" id="{E0F3852E-50D9-475E-859C-4759F4597D77}"/>
+              </a:ext>
+            </a:extLst>
+          </p:cNvPr>
+          <p:cNvSpPr txBox="1"/>
+          <p:nvPr/>
+        </p:nvSpPr>
+        <p:spPr>
+          <a:xfrm>
+            <a:off x="799773" y="4311838"/>
+            <a:ext cx="447955" cy="369332"/>
+          </a:xfrm>
+          <a:prstGeom prst="rect">
+            <a:avLst/>
+          </a:prstGeom>
+          <a:noFill/>
+        </p:spPr>
+        <p:txBody>
+          <a:bodyPr wrap="square" rtlCol="0">
+            <a:spAutoFit/>
+          </a:bodyPr>
+          <a:lstStyle/>
+          <a:p>
+            <a:r>
+              <a:rPr lang="en-AU" dirty="0"/>
+              <a:t>TF</a:t>
+            </a:r>
+          </a:p>
+        </p:txBody>
+      </p:sp>
+      <p:sp>
+        <p:nvSpPr>
+          <p:cNvPr id="23" name="TextBox 22">
+            <a:extLst>
+              <a:ext uri="{FF2B5EF4-FFF2-40B4-BE49-F238E27FC236}">
+                <a16:creationId xmlns:a16="http://schemas.microsoft.com/office/drawing/2014/main" id="{80BD391A-CE96-418E-9446-E1E22A986C61}"/>
+              </a:ext>
+            </a:extLst>
+          </p:cNvPr>
+          <p:cNvSpPr txBox="1"/>
+          <p:nvPr/>
+        </p:nvSpPr>
+        <p:spPr>
+          <a:xfrm>
+            <a:off x="1672074" y="1217866"/>
+            <a:ext cx="591952" cy="307777"/>
+          </a:xfrm>
+          <a:prstGeom prst="rect">
+            <a:avLst/>
+          </a:prstGeom>
+          <a:noFill/>
+        </p:spPr>
+        <p:txBody>
+          <a:bodyPr wrap="square" rtlCol="0">
+            <a:spAutoFit/>
+          </a:bodyPr>
+          <a:lstStyle/>
+          <a:p>
+            <a:r>
+              <a:rPr lang="en-AU" sz="1400" b="1" i="1" dirty="0"/>
+              <a:t>Exp1</a:t>
+            </a:r>
+          </a:p>
+        </p:txBody>
+      </p:sp>
+      <p:sp>
+        <p:nvSpPr>
+          <p:cNvPr id="24" name="TextBox 23">
+            <a:extLst>
+              <a:ext uri="{FF2B5EF4-FFF2-40B4-BE49-F238E27FC236}">
+                <a16:creationId xmlns:a16="http://schemas.microsoft.com/office/drawing/2014/main" id="{B039EE77-F8D3-4EB1-94D8-A99ABEEDE9BE}"/>
+              </a:ext>
+            </a:extLst>
+          </p:cNvPr>
+          <p:cNvSpPr txBox="1"/>
+          <p:nvPr/>
+        </p:nvSpPr>
+        <p:spPr>
+          <a:xfrm>
+            <a:off x="2376842" y="1217865"/>
+            <a:ext cx="591952" cy="307777"/>
+          </a:xfrm>
+          <a:prstGeom prst="rect">
+            <a:avLst/>
+          </a:prstGeom>
+          <a:noFill/>
+        </p:spPr>
+        <p:txBody>
+          <a:bodyPr wrap="square" rtlCol="0">
+            <a:spAutoFit/>
+          </a:bodyPr>
+          <a:lstStyle/>
+          <a:p>
+            <a:r>
+              <a:rPr lang="en-AU" sz="1400" b="1" i="1" dirty="0"/>
+              <a:t>Exp2</a:t>
+            </a:r>
+          </a:p>
+        </p:txBody>
+      </p:sp>
+      <p:sp>
+        <p:nvSpPr>
+          <p:cNvPr id="25" name="TextBox 24">
+            <a:extLst>
+              <a:ext uri="{FF2B5EF4-FFF2-40B4-BE49-F238E27FC236}">
+                <a16:creationId xmlns:a16="http://schemas.microsoft.com/office/drawing/2014/main" id="{9AC0DDDF-9473-460C-8E70-4D4AB2431CAB}"/>
+              </a:ext>
+            </a:extLst>
+          </p:cNvPr>
+          <p:cNvSpPr txBox="1"/>
+          <p:nvPr/>
+        </p:nvSpPr>
+        <p:spPr>
+          <a:xfrm>
+            <a:off x="3179233" y="1217864"/>
+            <a:ext cx="591952" cy="307777"/>
+          </a:xfrm>
+          <a:prstGeom prst="rect">
+            <a:avLst/>
+          </a:prstGeom>
+          <a:noFill/>
+        </p:spPr>
+        <p:txBody>
+          <a:bodyPr wrap="square" rtlCol="0">
+            <a:spAutoFit/>
+          </a:bodyPr>
+          <a:lstStyle/>
+          <a:p>
+            <a:r>
+              <a:rPr lang="en-AU" sz="1400" b="1" i="1" dirty="0"/>
+              <a:t>Exp3</a:t>
+            </a:r>
+          </a:p>
+        </p:txBody>
+      </p:sp>
+      <p:sp>
+        <p:nvSpPr>
+          <p:cNvPr id="26" name="TextBox 25">
+            <a:extLst>
+              <a:ext uri="{FF2B5EF4-FFF2-40B4-BE49-F238E27FC236}">
+                <a16:creationId xmlns:a16="http://schemas.microsoft.com/office/drawing/2014/main" id="{744E66B0-A722-4B24-957B-4113674A6CA4}"/>
+              </a:ext>
+            </a:extLst>
+          </p:cNvPr>
+          <p:cNvSpPr txBox="1"/>
+          <p:nvPr/>
+        </p:nvSpPr>
+        <p:spPr>
+          <a:xfrm>
+            <a:off x="3981625" y="1217865"/>
+            <a:ext cx="591952" cy="307777"/>
+          </a:xfrm>
+          <a:prstGeom prst="rect">
+            <a:avLst/>
+          </a:prstGeom>
+          <a:noFill/>
+        </p:spPr>
+        <p:txBody>
+          <a:bodyPr wrap="square" rtlCol="0">
+            <a:spAutoFit/>
+          </a:bodyPr>
+          <a:lstStyle/>
+          <a:p>
+            <a:r>
+              <a:rPr lang="en-AU" sz="1400" b="1" i="1" dirty="0"/>
+              <a:t>Exp4</a:t>
+            </a:r>
+          </a:p>
+        </p:txBody>
+      </p:sp>
+      <p:sp>
+        <p:nvSpPr>
+          <p:cNvPr id="27" name="TextBox 26">
+            <a:extLst>
+              <a:ext uri="{FF2B5EF4-FFF2-40B4-BE49-F238E27FC236}">
+                <a16:creationId xmlns:a16="http://schemas.microsoft.com/office/drawing/2014/main" id="{00B9B2E8-E126-4E91-9EFA-385E9A660D37}"/>
+              </a:ext>
+            </a:extLst>
+          </p:cNvPr>
+          <p:cNvSpPr txBox="1"/>
+          <p:nvPr/>
+        </p:nvSpPr>
+        <p:spPr>
+          <a:xfrm>
+            <a:off x="4915164" y="1217864"/>
+            <a:ext cx="591952" cy="307777"/>
+          </a:xfrm>
+          <a:prstGeom prst="rect">
+            <a:avLst/>
+          </a:prstGeom>
+          <a:noFill/>
+        </p:spPr>
+        <p:txBody>
+          <a:bodyPr wrap="square" rtlCol="0">
+            <a:spAutoFit/>
+          </a:bodyPr>
+          <a:lstStyle/>
+          <a:p>
+            <a:r>
+              <a:rPr lang="en-AU" sz="1400" b="1" i="1" dirty="0"/>
+              <a:t>Exp5</a:t>
+            </a:r>
+          </a:p>
+        </p:txBody>
+      </p:sp>
+      <p:sp>
+        <p:nvSpPr>
+          <p:cNvPr id="28" name="TextBox 27">
+            <a:extLst>
+              <a:ext uri="{FF2B5EF4-FFF2-40B4-BE49-F238E27FC236}">
+                <a16:creationId xmlns:a16="http://schemas.microsoft.com/office/drawing/2014/main" id="{B7EEA46B-6BAF-4A3D-81D1-E7DA29443477}"/>
+              </a:ext>
+            </a:extLst>
+          </p:cNvPr>
+          <p:cNvSpPr txBox="1"/>
+          <p:nvPr/>
+        </p:nvSpPr>
+        <p:spPr>
+          <a:xfrm>
+            <a:off x="5750054" y="1217864"/>
+            <a:ext cx="591952" cy="307777"/>
+          </a:xfrm>
+          <a:prstGeom prst="rect">
+            <a:avLst/>
+          </a:prstGeom>
+          <a:noFill/>
+        </p:spPr>
+        <p:txBody>
+          <a:bodyPr wrap="square" rtlCol="0">
+            <a:spAutoFit/>
+          </a:bodyPr>
+          <a:lstStyle/>
+          <a:p>
+            <a:r>
+              <a:rPr lang="en-AU" sz="1400" b="1" i="1" dirty="0"/>
+              <a:t>Exp6</a:t>
+            </a:r>
+          </a:p>
+        </p:txBody>
+      </p:sp>
+      <p:sp>
+        <p:nvSpPr>
+          <p:cNvPr id="29" name="TextBox 28">
+            <a:extLst>
+              <a:ext uri="{FF2B5EF4-FFF2-40B4-BE49-F238E27FC236}">
+                <a16:creationId xmlns:a16="http://schemas.microsoft.com/office/drawing/2014/main" id="{299B58C4-32BE-4122-A2F1-F9901F547CAD}"/>
+              </a:ext>
+            </a:extLst>
+          </p:cNvPr>
+          <p:cNvSpPr txBox="1"/>
+          <p:nvPr/>
+        </p:nvSpPr>
+        <p:spPr>
+          <a:xfrm>
+            <a:off x="6651095" y="1217864"/>
+            <a:ext cx="591952" cy="307777"/>
+          </a:xfrm>
+          <a:prstGeom prst="rect">
+            <a:avLst/>
+          </a:prstGeom>
+          <a:noFill/>
+        </p:spPr>
+        <p:txBody>
+          <a:bodyPr wrap="square" rtlCol="0">
+            <a:spAutoFit/>
+          </a:bodyPr>
+          <a:lstStyle/>
+          <a:p>
+            <a:r>
+              <a:rPr lang="en-AU" sz="1400" b="1" i="1" dirty="0"/>
+              <a:t>Exp7</a:t>
+            </a:r>
+          </a:p>
+        </p:txBody>
+      </p:sp>
+      <p:sp>
+        <p:nvSpPr>
+          <p:cNvPr id="30" name="TextBox 29">
+            <a:extLst>
+              <a:ext uri="{FF2B5EF4-FFF2-40B4-BE49-F238E27FC236}">
+                <a16:creationId xmlns:a16="http://schemas.microsoft.com/office/drawing/2014/main" id="{44F178AB-681A-48C5-8C3B-B194C061FBD6}"/>
+              </a:ext>
+            </a:extLst>
+          </p:cNvPr>
+          <p:cNvSpPr txBox="1"/>
+          <p:nvPr/>
+        </p:nvSpPr>
+        <p:spPr>
+          <a:xfrm>
+            <a:off x="7552136" y="1216706"/>
+            <a:ext cx="591952" cy="307777"/>
+          </a:xfrm>
+          <a:prstGeom prst="rect">
+            <a:avLst/>
+          </a:prstGeom>
+          <a:noFill/>
+        </p:spPr>
+        <p:txBody>
+          <a:bodyPr wrap="square" rtlCol="0">
+            <a:spAutoFit/>
+          </a:bodyPr>
+          <a:lstStyle/>
+          <a:p>
+            <a:r>
+              <a:rPr lang="en-AU" sz="1400" b="1" i="1" dirty="0"/>
+              <a:t>Exp8</a:t>
+            </a:r>
+          </a:p>
+        </p:txBody>
+      </p:sp>
+      <p:sp>
+        <p:nvSpPr>
+          <p:cNvPr id="31" name="TextBox 30">
+            <a:extLst>
+              <a:ext uri="{FF2B5EF4-FFF2-40B4-BE49-F238E27FC236}">
+                <a16:creationId xmlns:a16="http://schemas.microsoft.com/office/drawing/2014/main" id="{C238C9E2-8950-4D2E-A0D8-FC628D2B2156}"/>
+              </a:ext>
+            </a:extLst>
+          </p:cNvPr>
+          <p:cNvSpPr txBox="1"/>
+          <p:nvPr/>
+        </p:nvSpPr>
+        <p:spPr>
+          <a:xfrm>
+            <a:off x="8352834" y="1211499"/>
+            <a:ext cx="591952" cy="307777"/>
+          </a:xfrm>
+          <a:prstGeom prst="rect">
+            <a:avLst/>
+          </a:prstGeom>
+          <a:noFill/>
+        </p:spPr>
+        <p:txBody>
+          <a:bodyPr wrap="square" rtlCol="0">
+            <a:spAutoFit/>
+          </a:bodyPr>
+          <a:lstStyle/>
+          <a:p>
+            <a:r>
+              <a:rPr lang="en-AU" sz="1400" b="1" i="1" dirty="0"/>
+              <a:t>Exp9</a:t>
+            </a:r>
+          </a:p>
+        </p:txBody>
+      </p:sp>
+      <p:sp>
+        <p:nvSpPr>
+          <p:cNvPr id="32" name="Right Brace 31">
+            <a:extLst>
+              <a:ext uri="{FF2B5EF4-FFF2-40B4-BE49-F238E27FC236}">
+                <a16:creationId xmlns:a16="http://schemas.microsoft.com/office/drawing/2014/main" id="{A364C426-C86C-4F9A-8200-227E6A30E459}"/>
+              </a:ext>
+            </a:extLst>
+          </p:cNvPr>
+          <p:cNvSpPr/>
+          <p:nvPr/>
+        </p:nvSpPr>
+        <p:spPr>
+          <a:xfrm rot="16200000">
+            <a:off x="5049189" y="-2495938"/>
+            <a:ext cx="485192" cy="7450579"/>
+          </a:xfrm>
+          <a:prstGeom prst="rightBrace">
+            <a:avLst>
+              <a:gd name="adj1" fmla="val 8333"/>
+              <a:gd name="adj2" fmla="val 49479"/>
+            </a:avLst>
+          </a:prstGeom>
+          <a:ln>
+            <a:solidFill>
+              <a:schemeClr val="tx1"/>
+            </a:solidFill>
+          </a:ln>
+        </p:spPr>
+        <p:style>
+          <a:lnRef idx="1">
+            <a:schemeClr val="accent1"/>
+          </a:lnRef>
+          <a:fillRef idx="0">
+            <a:schemeClr val="accent1"/>
+          </a:fillRef>
+          <a:effectRef idx="0">
+            <a:schemeClr val="accent1"/>
+          </a:effectRef>
+          <a:fontRef idx="minor">
+            <a:schemeClr val="tx1"/>
+          </a:fontRef>
+        </p:style>
+        <p:txBody>
+          <a:bodyPr rtlCol="0" anchor="ctr"/>
+          <a:lstStyle/>
+          <a:p>
+            <a:pPr algn="ctr"/>
+            <a:endParaRPr lang="en-AU"/>
+          </a:p>
+        </p:txBody>
+      </p:sp>
+      <p:sp>
+        <p:nvSpPr>
+          <p:cNvPr id="33" name="TextBox 32">
+            <a:extLst>
+              <a:ext uri="{FF2B5EF4-FFF2-40B4-BE49-F238E27FC236}">
+                <a16:creationId xmlns:a16="http://schemas.microsoft.com/office/drawing/2014/main" id="{9D1C7588-A98C-4E4E-A0DD-EFEA3457F992}"/>
+              </a:ext>
+            </a:extLst>
+          </p:cNvPr>
+          <p:cNvSpPr txBox="1"/>
+          <p:nvPr/>
+        </p:nvSpPr>
+        <p:spPr>
+          <a:xfrm>
+            <a:off x="4624601" y="683266"/>
+            <a:ext cx="1471399" cy="276999"/>
+          </a:xfrm>
+          <a:prstGeom prst="rect">
+            <a:avLst/>
+          </a:prstGeom>
+          <a:noFill/>
+        </p:spPr>
+        <p:txBody>
+          <a:bodyPr wrap="square" rtlCol="0">
+            <a:spAutoFit/>
+          </a:bodyPr>
+          <a:lstStyle/>
+          <a:p>
+            <a:r>
+              <a:rPr lang="en-AU" sz="1200" dirty="0"/>
+              <a:t>Optimisation Tests</a:t>
+            </a:r>
+          </a:p>
+        </p:txBody>
+      </p:sp>
+      <p:sp>
+        <p:nvSpPr>
+          <p:cNvPr id="34" name="Right Brace 33">
+            <a:extLst>
+              <a:ext uri="{FF2B5EF4-FFF2-40B4-BE49-F238E27FC236}">
+                <a16:creationId xmlns:a16="http://schemas.microsoft.com/office/drawing/2014/main" id="{E13CA6B9-DDD8-4B32-BC79-857A1ED73E3E}"/>
+              </a:ext>
+            </a:extLst>
+          </p:cNvPr>
+          <p:cNvSpPr/>
+          <p:nvPr/>
+        </p:nvSpPr>
+        <p:spPr>
+          <a:xfrm rot="16200000">
+            <a:off x="9410362" y="693202"/>
+            <a:ext cx="485192" cy="1072300"/>
+          </a:xfrm>
+          <a:prstGeom prst="rightBrace">
+            <a:avLst>
+              <a:gd name="adj1" fmla="val 8333"/>
+              <a:gd name="adj2" fmla="val 49479"/>
+            </a:avLst>
+          </a:prstGeom>
+          <a:ln>
+            <a:solidFill>
+              <a:schemeClr val="tx1"/>
+            </a:solidFill>
+          </a:ln>
+        </p:spPr>
+        <p:style>
+          <a:lnRef idx="1">
+            <a:schemeClr val="accent1"/>
+          </a:lnRef>
+          <a:fillRef idx="0">
+            <a:schemeClr val="accent1"/>
+          </a:fillRef>
+          <a:effectRef idx="0">
+            <a:schemeClr val="accent1"/>
+          </a:effectRef>
+          <a:fontRef idx="minor">
+            <a:schemeClr val="tx1"/>
+          </a:fontRef>
+        </p:style>
+        <p:txBody>
+          <a:bodyPr rtlCol="0" anchor="ctr"/>
+          <a:lstStyle/>
+          <a:p>
+            <a:pPr algn="ctr"/>
+            <a:endParaRPr lang="en-AU" dirty="0"/>
+          </a:p>
+        </p:txBody>
+      </p:sp>
+      <p:sp>
+        <p:nvSpPr>
+          <p:cNvPr id="35" name="TextBox 34">
+            <a:extLst>
+              <a:ext uri="{FF2B5EF4-FFF2-40B4-BE49-F238E27FC236}">
+                <a16:creationId xmlns:a16="http://schemas.microsoft.com/office/drawing/2014/main" id="{C3037F3E-BBC7-4D58-ACA3-72397A10EEEF}"/>
+              </a:ext>
+            </a:extLst>
+          </p:cNvPr>
+          <p:cNvSpPr txBox="1"/>
+          <p:nvPr/>
+        </p:nvSpPr>
+        <p:spPr>
+          <a:xfrm>
+            <a:off x="8917258" y="549545"/>
+            <a:ext cx="1471399" cy="461665"/>
+          </a:xfrm>
+          <a:prstGeom prst="rect">
+            <a:avLst/>
+          </a:prstGeom>
+          <a:noFill/>
+        </p:spPr>
+        <p:txBody>
+          <a:bodyPr wrap="square" rtlCol="0">
+            <a:spAutoFit/>
+          </a:bodyPr>
+          <a:lstStyle/>
+          <a:p>
+            <a:pPr algn="ctr"/>
+            <a:r>
+              <a:rPr lang="en-AU" sz="1200" dirty="0"/>
+              <a:t>Chromosome-wise Tests</a:t>
+            </a:r>
+          </a:p>
+        </p:txBody>
+      </p:sp>
+      <p:sp>
+        <p:nvSpPr>
+          <p:cNvPr id="36" name="Right Brace 35">
+            <a:extLst>
+              <a:ext uri="{FF2B5EF4-FFF2-40B4-BE49-F238E27FC236}">
+                <a16:creationId xmlns:a16="http://schemas.microsoft.com/office/drawing/2014/main" id="{44D49721-074E-4A8F-B870-A1077CD41311}"/>
+              </a:ext>
+            </a:extLst>
+          </p:cNvPr>
+          <p:cNvSpPr/>
+          <p:nvPr/>
+        </p:nvSpPr>
+        <p:spPr>
+          <a:xfrm rot="16200000">
+            <a:off x="10804655" y="425396"/>
+            <a:ext cx="485192" cy="1607973"/>
+          </a:xfrm>
+          <a:prstGeom prst="rightBrace">
+            <a:avLst>
+              <a:gd name="adj1" fmla="val 8333"/>
+              <a:gd name="adj2" fmla="val 49479"/>
+            </a:avLst>
+          </a:prstGeom>
+          <a:ln>
+            <a:solidFill>
+              <a:schemeClr val="tx1"/>
+            </a:solidFill>
+          </a:ln>
+        </p:spPr>
+        <p:style>
+          <a:lnRef idx="1">
+            <a:schemeClr val="accent1"/>
+          </a:lnRef>
+          <a:fillRef idx="0">
+            <a:schemeClr val="accent1"/>
+          </a:fillRef>
+          <a:effectRef idx="0">
+            <a:schemeClr val="accent1"/>
+          </a:effectRef>
+          <a:fontRef idx="minor">
+            <a:schemeClr val="tx1"/>
+          </a:fontRef>
+        </p:style>
+        <p:txBody>
+          <a:bodyPr rtlCol="0" anchor="ctr"/>
+          <a:lstStyle/>
+          <a:p>
+            <a:pPr algn="ctr"/>
+            <a:endParaRPr lang="en-AU" dirty="0"/>
+          </a:p>
+        </p:txBody>
+      </p:sp>
+      <p:sp>
+        <p:nvSpPr>
+          <p:cNvPr id="38" name="TextBox 37">
+            <a:extLst>
+              <a:ext uri="{FF2B5EF4-FFF2-40B4-BE49-F238E27FC236}">
+                <a16:creationId xmlns:a16="http://schemas.microsoft.com/office/drawing/2014/main" id="{C6A96BD3-3C7C-4276-9856-68535ECE0A61}"/>
+              </a:ext>
+            </a:extLst>
+          </p:cNvPr>
+          <p:cNvSpPr txBox="1"/>
+          <p:nvPr/>
+        </p:nvSpPr>
+        <p:spPr>
+          <a:xfrm>
+            <a:off x="9108013" y="1260473"/>
+            <a:ext cx="695544" cy="307777"/>
+          </a:xfrm>
+          <a:prstGeom prst="rect">
+            <a:avLst/>
+          </a:prstGeom>
+          <a:noFill/>
+        </p:spPr>
+        <p:txBody>
+          <a:bodyPr wrap="square" rtlCol="0">
+            <a:spAutoFit/>
+          </a:bodyPr>
+          <a:lstStyle/>
+          <a:p>
+            <a:r>
+              <a:rPr lang="en-AU" sz="1400" b="1" i="1" dirty="0"/>
+              <a:t>Cr_09</a:t>
+            </a:r>
+          </a:p>
+        </p:txBody>
+      </p:sp>
+      <p:sp>
+        <p:nvSpPr>
+          <p:cNvPr id="39" name="TextBox 38">
+            <a:extLst>
+              <a:ext uri="{FF2B5EF4-FFF2-40B4-BE49-F238E27FC236}">
+                <a16:creationId xmlns:a16="http://schemas.microsoft.com/office/drawing/2014/main" id="{38EB1637-CF95-4B9C-ACCA-AA01950FE0C9}"/>
+              </a:ext>
+            </a:extLst>
+          </p:cNvPr>
+          <p:cNvSpPr txBox="1"/>
+          <p:nvPr/>
+        </p:nvSpPr>
+        <p:spPr>
+          <a:xfrm>
+            <a:off x="9591016" y="1260473"/>
+            <a:ext cx="606957" cy="307777"/>
+          </a:xfrm>
+          <a:prstGeom prst="rect">
+            <a:avLst/>
+          </a:prstGeom>
+          <a:noFill/>
+        </p:spPr>
+        <p:txBody>
+          <a:bodyPr wrap="square" rtlCol="0">
+            <a:spAutoFit/>
+          </a:bodyPr>
+          <a:lstStyle/>
+          <a:p>
+            <a:r>
+              <a:rPr lang="en-AU" sz="1400" b="1" i="1" dirty="0"/>
+              <a:t>Cr_19</a:t>
+            </a:r>
+          </a:p>
+        </p:txBody>
+      </p:sp>
+      <p:sp>
+        <p:nvSpPr>
+          <p:cNvPr id="40" name="TextBox 39">
+            <a:extLst>
+              <a:ext uri="{FF2B5EF4-FFF2-40B4-BE49-F238E27FC236}">
+                <a16:creationId xmlns:a16="http://schemas.microsoft.com/office/drawing/2014/main" id="{476D3571-A427-4871-8DBC-18AC6FBE10A1}"/>
+              </a:ext>
+            </a:extLst>
+          </p:cNvPr>
+          <p:cNvSpPr txBox="1"/>
+          <p:nvPr/>
+        </p:nvSpPr>
+        <p:spPr>
+          <a:xfrm>
+            <a:off x="10306084" y="542332"/>
+            <a:ext cx="1471399" cy="461665"/>
+          </a:xfrm>
+          <a:prstGeom prst="rect">
+            <a:avLst/>
+          </a:prstGeom>
+          <a:noFill/>
+        </p:spPr>
+        <p:txBody>
+          <a:bodyPr wrap="square" rtlCol="0">
+            <a:spAutoFit/>
+          </a:bodyPr>
+          <a:lstStyle/>
+          <a:p>
+            <a:pPr algn="ctr"/>
+            <a:r>
+              <a:rPr lang="en-AU" sz="1200" dirty="0"/>
+              <a:t>Model Comparison</a:t>
+            </a:r>
+          </a:p>
+          <a:p>
+            <a:pPr algn="ctr"/>
+            <a:r>
+              <a:rPr lang="en-AU" sz="1200" dirty="0"/>
+              <a:t>Tests (on all 3 </a:t>
+            </a:r>
+            <a:r>
+              <a:rPr lang="en-AU" sz="1200" dirty="0" err="1"/>
+              <a:t>cr’s</a:t>
+            </a:r>
+            <a:r>
+              <a:rPr lang="en-AU" sz="1200" dirty="0"/>
+              <a:t>)</a:t>
+            </a:r>
+          </a:p>
+        </p:txBody>
+      </p:sp>
+      <p:cxnSp>
+        <p:nvCxnSpPr>
+          <p:cNvPr id="41" name="Straight Connector 40">
+            <a:extLst>
+              <a:ext uri="{FF2B5EF4-FFF2-40B4-BE49-F238E27FC236}">
+                <a16:creationId xmlns:a16="http://schemas.microsoft.com/office/drawing/2014/main" id="{B36B13D1-2F4F-425C-88E5-C453225834DC}"/>
+              </a:ext>
+            </a:extLst>
+          </p:cNvPr>
+          <p:cNvCxnSpPr/>
+          <p:nvPr/>
+        </p:nvCxnSpPr>
+        <p:spPr>
+          <a:xfrm>
+            <a:off x="11041783" y="1570253"/>
+            <a:ext cx="0" cy="3166844"/>
+          </a:xfrm>
+          <a:prstGeom prst="line">
+            <a:avLst/>
+          </a:prstGeom>
+          <a:ln w="28575">
+            <a:solidFill>
+              <a:schemeClr val="accent1">
+                <a:lumMod val="75000"/>
+              </a:schemeClr>
+            </a:solidFill>
+          </a:ln>
+        </p:spPr>
+        <p:style>
+          <a:lnRef idx="1">
+            <a:schemeClr val="accent1"/>
+          </a:lnRef>
+          <a:fillRef idx="0">
+            <a:schemeClr val="accent1"/>
+          </a:fillRef>
+          <a:effectRef idx="0">
+            <a:schemeClr val="accent1"/>
+          </a:effectRef>
+          <a:fontRef idx="minor">
+            <a:schemeClr val="tx1"/>
+          </a:fontRef>
+        </p:style>
+      </p:cxnSp>
+      <p:sp>
+        <p:nvSpPr>
+          <p:cNvPr id="56" name="Rectangle 55">
+            <a:extLst>
+              <a:ext uri="{FF2B5EF4-FFF2-40B4-BE49-F238E27FC236}">
+                <a16:creationId xmlns:a16="http://schemas.microsoft.com/office/drawing/2014/main" id="{3FE14F3A-7C95-4643-9D7A-C823F7C1F9AB}"/>
+              </a:ext>
+            </a:extLst>
+          </p:cNvPr>
+          <p:cNvSpPr/>
+          <p:nvPr/>
+        </p:nvSpPr>
+        <p:spPr>
+          <a:xfrm>
+            <a:off x="1498858" y="1588684"/>
+            <a:ext cx="8699111" cy="468764"/>
+          </a:xfrm>
+          <a:prstGeom prst="rect">
+            <a:avLst/>
+          </a:prstGeom>
+          <a:solidFill>
+            <a:schemeClr val="accent6"/>
+          </a:solidFill>
+          <a:ln>
+            <a:solidFill>
+              <a:schemeClr val="accent6"/>
+            </a:solidFill>
+          </a:ln>
+        </p:spPr>
+        <p:style>
+          <a:lnRef idx="2">
+            <a:schemeClr val="accent1">
+              <a:shade val="50000"/>
+            </a:schemeClr>
+          </a:lnRef>
+          <a:fillRef idx="1">
+            <a:schemeClr val="accent1"/>
+          </a:fillRef>
+          <a:effectRef idx="0">
+            <a:schemeClr val="accent1"/>
+          </a:effectRef>
+          <a:fontRef idx="minor">
+            <a:schemeClr val="lt1"/>
+          </a:fontRef>
+        </p:style>
+        <p:txBody>
+          <a:bodyPr rtlCol="0" anchor="ctr"/>
+          <a:lstStyle/>
+          <a:p>
+            <a:pPr algn="ctr"/>
+            <a:endParaRPr lang="en-AU"/>
+          </a:p>
+        </p:txBody>
+      </p:sp>
+      <p:sp>
+        <p:nvSpPr>
+          <p:cNvPr id="4" name="Rectangle 3">
+            <a:extLst>
+              <a:ext uri="{FF2B5EF4-FFF2-40B4-BE49-F238E27FC236}">
+                <a16:creationId xmlns:a16="http://schemas.microsoft.com/office/drawing/2014/main" id="{D6F28803-8DA3-4501-A6A0-4129F882B466}"/>
+              </a:ext>
+            </a:extLst>
+          </p:cNvPr>
+          <p:cNvSpPr/>
+          <p:nvPr/>
+        </p:nvSpPr>
+        <p:spPr>
+          <a:xfrm>
+            <a:off x="1483135" y="1572256"/>
+            <a:ext cx="10368105" cy="485192"/>
+          </a:xfrm>
+          <a:prstGeom prst="rect">
+            <a:avLst/>
+          </a:prstGeom>
+          <a:noFill/>
+        </p:spPr>
+        <p:style>
+          <a:lnRef idx="2">
+            <a:schemeClr val="accent1">
+              <a:shade val="50000"/>
+            </a:schemeClr>
+          </a:lnRef>
+          <a:fillRef idx="1">
+            <a:schemeClr val="accent1"/>
+          </a:fillRef>
+          <a:effectRef idx="0">
+            <a:schemeClr val="accent1"/>
+          </a:effectRef>
+          <a:fontRef idx="minor">
+            <a:schemeClr val="lt1"/>
+          </a:fontRef>
+        </p:style>
+        <p:txBody>
+          <a:bodyPr rtlCol="0" anchor="ctr"/>
+          <a:lstStyle/>
+          <a:p>
+            <a:pPr algn="ctr"/>
+            <a:endParaRPr lang="en-AU"/>
+          </a:p>
+        </p:txBody>
+      </p:sp>
+      <p:cxnSp>
+        <p:nvCxnSpPr>
+          <p:cNvPr id="14" name="Straight Connector 13">
+            <a:extLst>
+              <a:ext uri="{FF2B5EF4-FFF2-40B4-BE49-F238E27FC236}">
+                <a16:creationId xmlns:a16="http://schemas.microsoft.com/office/drawing/2014/main" id="{8BF2829A-5435-41D6-81F0-96B89E829F13}"/>
+              </a:ext>
+            </a:extLst>
+          </p:cNvPr>
+          <p:cNvCxnSpPr/>
+          <p:nvPr/>
+        </p:nvCxnSpPr>
+        <p:spPr>
+          <a:xfrm>
+            <a:off x="10216789" y="1570253"/>
+            <a:ext cx="0" cy="3166844"/>
+          </a:xfrm>
+          <a:prstGeom prst="line">
+            <a:avLst/>
+          </a:prstGeom>
+          <a:ln w="38100">
+            <a:solidFill>
+              <a:srgbClr val="FF0000"/>
+            </a:solidFill>
+          </a:ln>
+        </p:spPr>
+        <p:style>
+          <a:lnRef idx="1">
+            <a:schemeClr val="accent1"/>
+          </a:lnRef>
+          <a:fillRef idx="0">
+            <a:schemeClr val="accent1"/>
+          </a:fillRef>
+          <a:effectRef idx="0">
+            <a:schemeClr val="accent1"/>
+          </a:effectRef>
+          <a:fontRef idx="minor">
+            <a:schemeClr val="tx1"/>
+          </a:fontRef>
+        </p:style>
+      </p:cxnSp>
+      <p:cxnSp>
+        <p:nvCxnSpPr>
+          <p:cNvPr id="13" name="Straight Connector 12">
+            <a:extLst>
+              <a:ext uri="{FF2B5EF4-FFF2-40B4-BE49-F238E27FC236}">
+                <a16:creationId xmlns:a16="http://schemas.microsoft.com/office/drawing/2014/main" id="{82169F8E-CB94-42DF-BDA5-8F5C8AF5F54D}"/>
+              </a:ext>
+            </a:extLst>
+          </p:cNvPr>
+          <p:cNvCxnSpPr/>
+          <p:nvPr/>
+        </p:nvCxnSpPr>
+        <p:spPr>
+          <a:xfrm>
+            <a:off x="9091266" y="1572256"/>
+            <a:ext cx="0" cy="3166844"/>
+          </a:xfrm>
+          <a:prstGeom prst="line">
+            <a:avLst/>
+          </a:prstGeom>
+          <a:ln w="38100">
+            <a:solidFill>
+              <a:srgbClr val="FF0000"/>
+            </a:solidFill>
+          </a:ln>
+        </p:spPr>
+        <p:style>
+          <a:lnRef idx="1">
+            <a:schemeClr val="accent1"/>
+          </a:lnRef>
+          <a:fillRef idx="0">
+            <a:schemeClr val="accent1"/>
+          </a:fillRef>
+          <a:effectRef idx="0">
+            <a:schemeClr val="accent1"/>
+          </a:effectRef>
+          <a:fontRef idx="minor">
+            <a:schemeClr val="tx1"/>
+          </a:fontRef>
+        </p:style>
+      </p:cxnSp>
+      <p:cxnSp>
+        <p:nvCxnSpPr>
+          <p:cNvPr id="15" name="Straight Connector 14">
+            <a:extLst>
+              <a:ext uri="{FF2B5EF4-FFF2-40B4-BE49-F238E27FC236}">
+                <a16:creationId xmlns:a16="http://schemas.microsoft.com/office/drawing/2014/main" id="{E1059841-9E49-4582-8565-AE642DBAA42B}"/>
+              </a:ext>
+            </a:extLst>
+          </p:cNvPr>
+          <p:cNvCxnSpPr/>
+          <p:nvPr/>
+        </p:nvCxnSpPr>
+        <p:spPr>
+          <a:xfrm>
+            <a:off x="2272414" y="1572256"/>
+            <a:ext cx="0" cy="3166844"/>
+          </a:xfrm>
+          <a:prstGeom prst="line">
+            <a:avLst/>
+          </a:prstGeom>
+          <a:ln w="28575">
+            <a:solidFill>
+              <a:schemeClr val="tx2">
+                <a:lumMod val="75000"/>
+              </a:schemeClr>
+            </a:solidFill>
+          </a:ln>
+        </p:spPr>
+        <p:style>
+          <a:lnRef idx="1">
+            <a:schemeClr val="accent1"/>
+          </a:lnRef>
+          <a:fillRef idx="0">
+            <a:schemeClr val="accent1"/>
+          </a:fillRef>
+          <a:effectRef idx="0">
+            <a:schemeClr val="accent1"/>
+          </a:effectRef>
+          <a:fontRef idx="minor">
+            <a:schemeClr val="tx1"/>
+          </a:fontRef>
+        </p:style>
+      </p:cxnSp>
+      <p:cxnSp>
+        <p:nvCxnSpPr>
+          <p:cNvPr id="16" name="Straight Connector 15">
+            <a:extLst>
+              <a:ext uri="{FF2B5EF4-FFF2-40B4-BE49-F238E27FC236}">
+                <a16:creationId xmlns:a16="http://schemas.microsoft.com/office/drawing/2014/main" id="{17434CD2-084D-4A1E-9609-1900B54468CE}"/>
+              </a:ext>
+            </a:extLst>
+          </p:cNvPr>
+          <p:cNvCxnSpPr/>
+          <p:nvPr/>
+        </p:nvCxnSpPr>
+        <p:spPr>
+          <a:xfrm>
+            <a:off x="3020433" y="1572256"/>
+            <a:ext cx="0" cy="3166844"/>
+          </a:xfrm>
+          <a:prstGeom prst="line">
+            <a:avLst/>
+          </a:prstGeom>
+          <a:ln w="28575">
+            <a:solidFill>
+              <a:schemeClr val="tx2">
+                <a:lumMod val="75000"/>
+              </a:schemeClr>
+            </a:solidFill>
+          </a:ln>
+        </p:spPr>
+        <p:style>
+          <a:lnRef idx="1">
+            <a:schemeClr val="accent1"/>
+          </a:lnRef>
+          <a:fillRef idx="0">
+            <a:schemeClr val="accent1"/>
+          </a:fillRef>
+          <a:effectRef idx="0">
+            <a:schemeClr val="accent1"/>
+          </a:effectRef>
+          <a:fontRef idx="minor">
+            <a:schemeClr val="tx1"/>
+          </a:fontRef>
+        </p:style>
+      </p:cxnSp>
+      <p:cxnSp>
+        <p:nvCxnSpPr>
+          <p:cNvPr id="17" name="Straight Connector 16">
+            <a:extLst>
+              <a:ext uri="{FF2B5EF4-FFF2-40B4-BE49-F238E27FC236}">
+                <a16:creationId xmlns:a16="http://schemas.microsoft.com/office/drawing/2014/main" id="{3C1A3DFC-7903-4FDE-B7A0-9888A63751A8}"/>
+              </a:ext>
+            </a:extLst>
+          </p:cNvPr>
+          <p:cNvCxnSpPr/>
+          <p:nvPr/>
+        </p:nvCxnSpPr>
+        <p:spPr>
+          <a:xfrm>
+            <a:off x="7407875" y="1572256"/>
+            <a:ext cx="0" cy="3166844"/>
+          </a:xfrm>
+          <a:prstGeom prst="line">
+            <a:avLst/>
+          </a:prstGeom>
+          <a:ln w="28575">
+            <a:solidFill>
+              <a:schemeClr val="tx2">
+                <a:lumMod val="75000"/>
+              </a:schemeClr>
+            </a:solidFill>
+          </a:ln>
+        </p:spPr>
+        <p:style>
+          <a:lnRef idx="1">
+            <a:schemeClr val="accent1"/>
+          </a:lnRef>
+          <a:fillRef idx="0">
+            <a:schemeClr val="accent1"/>
+          </a:fillRef>
+          <a:effectRef idx="0">
+            <a:schemeClr val="accent1"/>
+          </a:effectRef>
+          <a:fontRef idx="minor">
+            <a:schemeClr val="tx1"/>
+          </a:fontRef>
+        </p:style>
+      </p:cxnSp>
+      <p:cxnSp>
+        <p:nvCxnSpPr>
+          <p:cNvPr id="18" name="Straight Connector 17">
+            <a:extLst>
+              <a:ext uri="{FF2B5EF4-FFF2-40B4-BE49-F238E27FC236}">
+                <a16:creationId xmlns:a16="http://schemas.microsoft.com/office/drawing/2014/main" id="{BF28F843-C623-4E4A-9D46-08F7CC57F695}"/>
+              </a:ext>
+            </a:extLst>
+          </p:cNvPr>
+          <p:cNvCxnSpPr/>
+          <p:nvPr/>
+        </p:nvCxnSpPr>
+        <p:spPr>
+          <a:xfrm>
+            <a:off x="6501864" y="1572256"/>
+            <a:ext cx="0" cy="3166844"/>
+          </a:xfrm>
+          <a:prstGeom prst="line">
+            <a:avLst/>
+          </a:prstGeom>
+          <a:ln w="28575">
+            <a:solidFill>
+              <a:schemeClr val="tx2">
+                <a:lumMod val="75000"/>
+              </a:schemeClr>
+            </a:solidFill>
+          </a:ln>
+        </p:spPr>
+        <p:style>
+          <a:lnRef idx="1">
+            <a:schemeClr val="accent1"/>
+          </a:lnRef>
+          <a:fillRef idx="0">
+            <a:schemeClr val="accent1"/>
+          </a:fillRef>
+          <a:effectRef idx="0">
+            <a:schemeClr val="accent1"/>
+          </a:effectRef>
+          <a:fontRef idx="minor">
+            <a:schemeClr val="tx1"/>
+          </a:fontRef>
+        </p:style>
+      </p:cxnSp>
+      <p:cxnSp>
+        <p:nvCxnSpPr>
+          <p:cNvPr id="19" name="Straight Connector 18">
+            <a:extLst>
+              <a:ext uri="{FF2B5EF4-FFF2-40B4-BE49-F238E27FC236}">
+                <a16:creationId xmlns:a16="http://schemas.microsoft.com/office/drawing/2014/main" id="{6E9DFDCB-987F-49DD-8AC0-8C3AE6DF209E}"/>
+              </a:ext>
+            </a:extLst>
+          </p:cNvPr>
+          <p:cNvCxnSpPr/>
+          <p:nvPr/>
+        </p:nvCxnSpPr>
+        <p:spPr>
+          <a:xfrm>
+            <a:off x="5654576" y="1572256"/>
+            <a:ext cx="0" cy="3166844"/>
+          </a:xfrm>
+          <a:prstGeom prst="line">
+            <a:avLst/>
+          </a:prstGeom>
+          <a:ln w="28575">
+            <a:solidFill>
+              <a:schemeClr val="tx2">
+                <a:lumMod val="75000"/>
+              </a:schemeClr>
+            </a:solidFill>
+          </a:ln>
+        </p:spPr>
+        <p:style>
+          <a:lnRef idx="1">
+            <a:schemeClr val="accent1"/>
+          </a:lnRef>
+          <a:fillRef idx="0">
+            <a:schemeClr val="accent1"/>
+          </a:fillRef>
+          <a:effectRef idx="0">
+            <a:schemeClr val="accent1"/>
+          </a:effectRef>
+          <a:fontRef idx="minor">
+            <a:schemeClr val="tx1"/>
+          </a:fontRef>
+        </p:style>
+      </p:cxnSp>
+      <p:cxnSp>
+        <p:nvCxnSpPr>
+          <p:cNvPr id="20" name="Straight Connector 19">
+            <a:extLst>
+              <a:ext uri="{FF2B5EF4-FFF2-40B4-BE49-F238E27FC236}">
+                <a16:creationId xmlns:a16="http://schemas.microsoft.com/office/drawing/2014/main" id="{876A6EEB-17D9-4DEA-BD2D-F83593852AA2}"/>
+              </a:ext>
+            </a:extLst>
+          </p:cNvPr>
+          <p:cNvCxnSpPr/>
+          <p:nvPr/>
+        </p:nvCxnSpPr>
+        <p:spPr>
+          <a:xfrm>
+            <a:off x="4782121" y="1572256"/>
+            <a:ext cx="0" cy="3166844"/>
+          </a:xfrm>
+          <a:prstGeom prst="line">
+            <a:avLst/>
+          </a:prstGeom>
+          <a:ln w="28575">
+            <a:solidFill>
+              <a:schemeClr val="tx2">
+                <a:lumMod val="75000"/>
+              </a:schemeClr>
+            </a:solidFill>
+          </a:ln>
+        </p:spPr>
+        <p:style>
+          <a:lnRef idx="1">
+            <a:schemeClr val="accent1"/>
+          </a:lnRef>
+          <a:fillRef idx="0">
+            <a:schemeClr val="accent1"/>
+          </a:fillRef>
+          <a:effectRef idx="0">
+            <a:schemeClr val="accent1"/>
+          </a:effectRef>
+          <a:fontRef idx="minor">
+            <a:schemeClr val="tx1"/>
+          </a:fontRef>
+        </p:style>
+      </p:cxnSp>
+      <p:cxnSp>
+        <p:nvCxnSpPr>
+          <p:cNvPr id="21" name="Straight Connector 20">
+            <a:extLst>
+              <a:ext uri="{FF2B5EF4-FFF2-40B4-BE49-F238E27FC236}">
+                <a16:creationId xmlns:a16="http://schemas.microsoft.com/office/drawing/2014/main" id="{7EEF3FB1-17DE-405A-99CC-85DFD1513186}"/>
+              </a:ext>
+            </a:extLst>
+          </p:cNvPr>
+          <p:cNvCxnSpPr/>
+          <p:nvPr/>
+        </p:nvCxnSpPr>
+        <p:spPr>
+          <a:xfrm>
+            <a:off x="3867721" y="1572256"/>
+            <a:ext cx="0" cy="3166844"/>
+          </a:xfrm>
+          <a:prstGeom prst="line">
+            <a:avLst/>
+          </a:prstGeom>
+          <a:ln w="28575">
+            <a:solidFill>
+              <a:schemeClr val="tx2">
+                <a:lumMod val="75000"/>
+              </a:schemeClr>
+            </a:solidFill>
+          </a:ln>
+        </p:spPr>
+        <p:style>
+          <a:lnRef idx="1">
+            <a:schemeClr val="accent1"/>
+          </a:lnRef>
+          <a:fillRef idx="0">
+            <a:schemeClr val="accent1"/>
+          </a:fillRef>
+          <a:effectRef idx="0">
+            <a:schemeClr val="accent1"/>
+          </a:effectRef>
+          <a:fontRef idx="minor">
+            <a:schemeClr val="tx1"/>
+          </a:fontRef>
+        </p:style>
+      </p:cxnSp>
+      <p:cxnSp>
+        <p:nvCxnSpPr>
+          <p:cNvPr id="22" name="Straight Connector 21">
+            <a:extLst>
+              <a:ext uri="{FF2B5EF4-FFF2-40B4-BE49-F238E27FC236}">
+                <a16:creationId xmlns:a16="http://schemas.microsoft.com/office/drawing/2014/main" id="{60F73B3C-4873-4739-8369-E8946EC1C4FD}"/>
+              </a:ext>
+            </a:extLst>
+          </p:cNvPr>
+          <p:cNvCxnSpPr/>
+          <p:nvPr/>
+        </p:nvCxnSpPr>
+        <p:spPr>
+          <a:xfrm>
+            <a:off x="8239783" y="1570253"/>
+            <a:ext cx="0" cy="3166844"/>
+          </a:xfrm>
+          <a:prstGeom prst="line">
+            <a:avLst/>
+          </a:prstGeom>
+          <a:ln w="28575">
+            <a:solidFill>
+              <a:schemeClr val="tx2">
+                <a:lumMod val="75000"/>
+              </a:schemeClr>
+            </a:solidFill>
+          </a:ln>
+        </p:spPr>
+        <p:style>
+          <a:lnRef idx="1">
+            <a:schemeClr val="accent1"/>
+          </a:lnRef>
+          <a:fillRef idx="0">
+            <a:schemeClr val="accent1"/>
+          </a:fillRef>
+          <a:effectRef idx="0">
+            <a:schemeClr val="accent1"/>
+          </a:effectRef>
+          <a:fontRef idx="minor">
+            <a:schemeClr val="tx1"/>
+          </a:fontRef>
+        </p:style>
+      </p:cxnSp>
+      <p:cxnSp>
+        <p:nvCxnSpPr>
+          <p:cNvPr id="37" name="Straight Connector 36">
+            <a:extLst>
+              <a:ext uri="{FF2B5EF4-FFF2-40B4-BE49-F238E27FC236}">
+                <a16:creationId xmlns:a16="http://schemas.microsoft.com/office/drawing/2014/main" id="{0EFFC0A9-BD75-4816-8DCB-9DC3F48B0D14}"/>
+              </a:ext>
+            </a:extLst>
+          </p:cNvPr>
+          <p:cNvCxnSpPr/>
+          <p:nvPr/>
+        </p:nvCxnSpPr>
+        <p:spPr>
+          <a:xfrm>
+            <a:off x="9667309" y="1570253"/>
+            <a:ext cx="0" cy="3166844"/>
+          </a:xfrm>
+          <a:prstGeom prst="line">
+            <a:avLst/>
+          </a:prstGeom>
+          <a:ln w="28575">
+            <a:solidFill>
+              <a:schemeClr val="bg2">
+                <a:lumMod val="75000"/>
+              </a:schemeClr>
+            </a:solidFill>
+          </a:ln>
+        </p:spPr>
+        <p:style>
+          <a:lnRef idx="1">
+            <a:schemeClr val="accent1"/>
+          </a:lnRef>
+          <a:fillRef idx="0">
+            <a:schemeClr val="accent1"/>
+          </a:fillRef>
+          <a:effectRef idx="0">
+            <a:schemeClr val="accent1"/>
+          </a:effectRef>
+          <a:fontRef idx="minor">
+            <a:schemeClr val="tx1"/>
+          </a:fontRef>
+        </p:style>
+      </p:cxnSp>
+      <p:sp>
+        <p:nvSpPr>
+          <p:cNvPr id="64" name="TextBox 63">
+            <a:extLst>
+              <a:ext uri="{FF2B5EF4-FFF2-40B4-BE49-F238E27FC236}">
+                <a16:creationId xmlns:a16="http://schemas.microsoft.com/office/drawing/2014/main" id="{D00A4D0C-7601-4B60-B49E-CDBCBA6F7A56}"/>
+              </a:ext>
+            </a:extLst>
+          </p:cNvPr>
+          <p:cNvSpPr txBox="1"/>
+          <p:nvPr/>
+        </p:nvSpPr>
+        <p:spPr>
+          <a:xfrm>
+            <a:off x="10341371" y="1235145"/>
+            <a:ext cx="694464" cy="307777"/>
+          </a:xfrm>
+          <a:prstGeom prst="rect">
+            <a:avLst/>
+          </a:prstGeom>
+          <a:noFill/>
+        </p:spPr>
+        <p:txBody>
+          <a:bodyPr wrap="square" rtlCol="0">
+            <a:spAutoFit/>
+          </a:bodyPr>
+          <a:lstStyle/>
+          <a:p>
+            <a:r>
+              <a:rPr lang="en-AU" sz="1400" b="1" i="1" dirty="0" err="1"/>
+              <a:t>DeepC</a:t>
+            </a:r>
+            <a:endParaRPr lang="en-AU" sz="1400" b="1" i="1" dirty="0"/>
+          </a:p>
+        </p:txBody>
+      </p:sp>
+      <p:sp>
+        <p:nvSpPr>
+          <p:cNvPr id="65" name="Rectangle 64">
+            <a:extLst>
+              <a:ext uri="{FF2B5EF4-FFF2-40B4-BE49-F238E27FC236}">
+                <a16:creationId xmlns:a16="http://schemas.microsoft.com/office/drawing/2014/main" id="{8BC74292-05DB-486E-9F09-17687B36B533}"/>
+              </a:ext>
+            </a:extLst>
+          </p:cNvPr>
+          <p:cNvSpPr/>
+          <p:nvPr/>
+        </p:nvSpPr>
+        <p:spPr>
+          <a:xfrm>
+            <a:off x="1586201" y="5161296"/>
+            <a:ext cx="712382" cy="474719"/>
+          </a:xfrm>
+          <a:prstGeom prst="rect">
+            <a:avLst/>
+          </a:prstGeom>
+          <a:solidFill>
+            <a:schemeClr val="accent6"/>
+          </a:solidFill>
+          <a:ln>
+            <a:solidFill>
+              <a:schemeClr val="accent6"/>
+            </a:solidFill>
+          </a:ln>
+        </p:spPr>
+        <p:style>
+          <a:lnRef idx="2">
+            <a:schemeClr val="accent1">
+              <a:shade val="50000"/>
+            </a:schemeClr>
+          </a:lnRef>
+          <a:fillRef idx="1">
+            <a:schemeClr val="accent1"/>
+          </a:fillRef>
+          <a:effectRef idx="0">
+            <a:schemeClr val="accent1"/>
+          </a:effectRef>
+          <a:fontRef idx="minor">
+            <a:schemeClr val="lt1"/>
+          </a:fontRef>
+        </p:style>
+        <p:txBody>
+          <a:bodyPr rtlCol="0" anchor="ctr"/>
+          <a:lstStyle/>
+          <a:p>
+            <a:pPr algn="ctr"/>
+            <a:endParaRPr lang="en-AU"/>
+          </a:p>
+        </p:txBody>
+      </p:sp>
+      <p:sp>
+        <p:nvSpPr>
+          <p:cNvPr id="66" name="Rectangle 65">
+            <a:extLst>
+              <a:ext uri="{FF2B5EF4-FFF2-40B4-BE49-F238E27FC236}">
+                <a16:creationId xmlns:a16="http://schemas.microsoft.com/office/drawing/2014/main" id="{972BAE7E-4C73-405D-B04C-BAF2A84464BB}"/>
+              </a:ext>
+            </a:extLst>
+          </p:cNvPr>
+          <p:cNvSpPr/>
+          <p:nvPr/>
+        </p:nvSpPr>
+        <p:spPr>
+          <a:xfrm>
+            <a:off x="1586202" y="5804902"/>
+            <a:ext cx="712382" cy="464246"/>
+          </a:xfrm>
+          <a:prstGeom prst="rect">
+            <a:avLst/>
+          </a:prstGeom>
+          <a:solidFill>
+            <a:srgbClr val="FFC000"/>
+          </a:solidFill>
+          <a:ln>
+            <a:solidFill>
+              <a:srgbClr val="FFC000"/>
+            </a:solidFill>
+          </a:ln>
+        </p:spPr>
+        <p:style>
+          <a:lnRef idx="2">
+            <a:schemeClr val="accent1">
+              <a:shade val="50000"/>
+            </a:schemeClr>
+          </a:lnRef>
+          <a:fillRef idx="1">
+            <a:schemeClr val="accent1"/>
+          </a:fillRef>
+          <a:effectRef idx="0">
+            <a:schemeClr val="accent1"/>
+          </a:effectRef>
+          <a:fontRef idx="minor">
+            <a:schemeClr val="lt1"/>
+          </a:fontRef>
+        </p:style>
+        <p:txBody>
+          <a:bodyPr rtlCol="0" anchor="ctr"/>
+          <a:lstStyle/>
+          <a:p>
+            <a:pPr algn="ctr"/>
+            <a:endParaRPr lang="en-AU"/>
+          </a:p>
+        </p:txBody>
+      </p:sp>
+      <p:sp>
+        <p:nvSpPr>
+          <p:cNvPr id="67" name="TextBox 66">
+            <a:extLst>
+              <a:ext uri="{FF2B5EF4-FFF2-40B4-BE49-F238E27FC236}">
+                <a16:creationId xmlns:a16="http://schemas.microsoft.com/office/drawing/2014/main" id="{C094AE0A-AB00-41DE-9604-71BD80566C8B}"/>
+              </a:ext>
+            </a:extLst>
+          </p:cNvPr>
+          <p:cNvSpPr txBox="1"/>
+          <p:nvPr/>
+        </p:nvSpPr>
+        <p:spPr>
+          <a:xfrm>
+            <a:off x="822120" y="5167465"/>
+            <a:ext cx="683361" cy="369332"/>
+          </a:xfrm>
+          <a:prstGeom prst="rect">
+            <a:avLst/>
+          </a:prstGeom>
+          <a:noFill/>
+        </p:spPr>
+        <p:txBody>
+          <a:bodyPr wrap="square" rtlCol="0">
+            <a:spAutoFit/>
+          </a:bodyPr>
+          <a:lstStyle/>
+          <a:p>
+            <a:r>
+              <a:rPr lang="en-AU" dirty="0"/>
+              <a:t>Done</a:t>
+            </a:r>
+          </a:p>
+        </p:txBody>
+      </p:sp>
+      <p:sp>
+        <p:nvSpPr>
+          <p:cNvPr id="68" name="TextBox 67">
+            <a:extLst>
+              <a:ext uri="{FF2B5EF4-FFF2-40B4-BE49-F238E27FC236}">
+                <a16:creationId xmlns:a16="http://schemas.microsoft.com/office/drawing/2014/main" id="{7DA98D53-3BDB-40CD-ACB3-BFE87715BCAC}"/>
+              </a:ext>
+            </a:extLst>
+          </p:cNvPr>
+          <p:cNvSpPr txBox="1"/>
+          <p:nvPr/>
+        </p:nvSpPr>
+        <p:spPr>
+          <a:xfrm>
+            <a:off x="302518" y="5804902"/>
+            <a:ext cx="1283683" cy="369332"/>
+          </a:xfrm>
+          <a:prstGeom prst="rect">
+            <a:avLst/>
+          </a:prstGeom>
+          <a:noFill/>
+        </p:spPr>
+        <p:txBody>
+          <a:bodyPr wrap="square" rtlCol="0">
+            <a:spAutoFit/>
+          </a:bodyPr>
+          <a:lstStyle/>
+          <a:p>
+            <a:r>
+              <a:rPr lang="en-AU" dirty="0"/>
+              <a:t>In progress</a:t>
+            </a:r>
+          </a:p>
+        </p:txBody>
+      </p:sp>
+      <p:sp>
+        <p:nvSpPr>
+          <p:cNvPr id="69" name="TextBox 68">
+            <a:extLst>
+              <a:ext uri="{FF2B5EF4-FFF2-40B4-BE49-F238E27FC236}">
+                <a16:creationId xmlns:a16="http://schemas.microsoft.com/office/drawing/2014/main" id="{181918A2-5249-4236-AA2B-671AC8C45B71}"/>
+              </a:ext>
+            </a:extLst>
+          </p:cNvPr>
+          <p:cNvSpPr txBox="1"/>
+          <p:nvPr/>
+        </p:nvSpPr>
+        <p:spPr>
+          <a:xfrm>
+            <a:off x="11179233" y="1223099"/>
+            <a:ext cx="694464" cy="307777"/>
+          </a:xfrm>
+          <a:prstGeom prst="rect">
+            <a:avLst/>
+          </a:prstGeom>
+          <a:noFill/>
+        </p:spPr>
+        <p:txBody>
+          <a:bodyPr wrap="square" rtlCol="0">
+            <a:spAutoFit/>
+          </a:bodyPr>
+          <a:lstStyle/>
+          <a:p>
+            <a:r>
+              <a:rPr lang="en-AU" sz="1400" b="1" i="1" dirty="0" err="1"/>
+              <a:t>Rnn</a:t>
+            </a:r>
+            <a:endParaRPr lang="en-AU" sz="1400" b="1" i="1" dirty="0"/>
+          </a:p>
+        </p:txBody>
+      </p:sp>
+    </p:spTree>
+    <p:extLst>
+      <p:ext uri="{BB962C8B-B14F-4D97-AF65-F5344CB8AC3E}">
+        <p14:creationId xmlns:p14="http://schemas.microsoft.com/office/powerpoint/2010/main" val="909608938"/>
       </p:ext>
     </p:extLst>
   </p:cSld>

</xml_diff>